<commit_message>
RF3 Busca rapida - Adicionando tela de login
</commit_message>
<xml_diff>
--- a/StoryBoards/StoryBoard_RF3_AcessoAAcervo_BuscaRapida.pptx
+++ b/StoryBoards/StoryBoard_RF3_AcessoAAcervo_BuscaRapida.pptx
@@ -2,10 +2,10 @@
 <file path=ppt/presentation.xml><?xml version="1.0" encoding="utf-8"?>
 <p:presentation xmlns:a="http://schemas.openxmlformats.org/drawingml/2006/main" xmlns:r="http://schemas.openxmlformats.org/officeDocument/2006/relationships" xmlns:p="http://schemas.openxmlformats.org/presentationml/2006/main" saveSubsetFonts="1">
   <p:sldMasterIdLst>
-    <p:sldMasterId id="2147483648" r:id="rId1"/>
+    <p:sldMasterId id="2147483648" r:id="rId19"/>
   </p:sldMasterIdLst>
   <p:sldIdLst>
-    <p:sldId id="256" r:id="rId2"/>
+    <p:sldId id="256" r:id="rId20"/>
   </p:sldIdLst>
   <p:sldSz cx="12192000" cy="6858000"/>
   <p:notesSz cx="6858000" cy="9144000"/>
@@ -104,6 +104,11 @@
       </a:defRPr>
     </a:lvl9pPr>
   </p:defaultTextStyle>
+  <p:extLst>
+    <p:ext uri="{EFAFB233-063F-42B5-8137-9DF3F51BA10A}">
+      <p15:sldGuideLst xmlns:p15="http://schemas.microsoft.com/office/powerpoint/2012/main"/>
+    </p:ext>
+  </p:extLst>
 </p:presentation>
 </file>
 
@@ -2947,41 +2952,1551 @@
           <a:chExt cx="0" cy="0"/>
         </a:xfrm>
       </p:grpSpPr>
-      <p:sp>
-        <p:nvSpPr>
-          <p:cNvPr id="2" name="Título 1"/>
-          <p:cNvSpPr>
-            <a:spLocks noGrp="1"/>
-          </p:cNvSpPr>
-          <p:nvPr>
-            <p:ph type="ctrTitle"/>
-          </p:nvPr>
-        </p:nvSpPr>
-        <p:spPr/>
-        <p:txBody>
-          <a:bodyPr/>
-          <a:lstStyle/>
-          <a:p>
-            <a:endParaRPr lang="pt-BR"/>
-          </a:p>
-        </p:txBody>
-      </p:sp>
-      <p:sp>
-        <p:nvSpPr>
-          <p:cNvPr id="3" name="Subtítulo 2"/>
-          <p:cNvSpPr>
-            <a:spLocks noGrp="1"/>
-          </p:cNvSpPr>
-          <p:nvPr>
-            <p:ph type="subTitle" idx="1"/>
-          </p:nvPr>
-        </p:nvSpPr>
-        <p:spPr/>
-        <p:txBody>
-          <a:bodyPr/>
-          <a:lstStyle/>
-          <a:p>
-            <a:endParaRPr lang="pt-BR"/>
+      <p:grpSp>
+        <p:nvGrpSpPr>
+          <p:cNvPr id="4" name="WebBrowser"/>
+          <p:cNvGrpSpPr/>
+          <p:nvPr>
+            <p:custDataLst>
+              <p:custData r:id="rId1"/>
+            </p:custDataLst>
+          </p:nvPr>
+        </p:nvGrpSpPr>
+        <p:grpSpPr>
+          <a:xfrm>
+            <a:off x="0" y="0"/>
+            <a:ext cx="12192000" cy="6858000"/>
+            <a:chOff x="0" y="0"/>
+            <a:chExt cx="9144000" cy="6858000"/>
+          </a:xfrm>
+        </p:grpSpPr>
+        <p:sp>
+          <p:nvSpPr>
+            <p:cNvPr id="5" name="Background"/>
+            <p:cNvSpPr/>
+            <p:nvPr/>
+          </p:nvSpPr>
+          <p:spPr>
+            <a:xfrm>
+              <a:off x="0" y="0"/>
+              <a:ext cx="9144000" cy="6858000"/>
+            </a:xfrm>
+            <a:prstGeom prst="rect">
+              <a:avLst/>
+            </a:prstGeom>
+            <a:solidFill>
+              <a:srgbClr val="FFFFFF">
+                <a:lumMod val="65000"/>
+              </a:srgbClr>
+            </a:solidFill>
+            <a:ln w="3175" cap="flat" cmpd="sng" algn="ctr">
+              <a:solidFill>
+                <a:srgbClr val="000000">
+                  <a:lumMod val="50000"/>
+                  <a:lumOff val="50000"/>
+                </a:srgbClr>
+              </a:solidFill>
+              <a:prstDash val="solid"/>
+            </a:ln>
+            <a:effectLst/>
+          </p:spPr>
+          <p:txBody>
+            <a:bodyPr rtlCol="0" anchor="ctr"/>
+            <a:lstStyle/>
+            <a:p>
+              <a:pPr algn="ctr"/>
+              <a:endParaRPr lang="pt-BR" sz="1050" kern="0">
+                <a:solidFill>
+                  <a:prstClr val="white"/>
+                </a:solidFill>
+                <a:latin typeface="Segoe UI"/>
+              </a:endParaRPr>
+            </a:p>
+          </p:txBody>
+        </p:sp>
+        <p:sp>
+          <p:nvSpPr>
+            <p:cNvPr id="6" name="WindowTitle"/>
+            <p:cNvSpPr txBox="1"/>
+            <p:nvPr/>
+          </p:nvSpPr>
+          <p:spPr>
+            <a:xfrm>
+              <a:off x="22515" y="22341"/>
+              <a:ext cx="882021" cy="230832"/>
+            </a:xfrm>
+            <a:prstGeom prst="rect">
+              <a:avLst/>
+            </a:prstGeom>
+            <a:noFill/>
+          </p:spPr>
+          <p:txBody>
+            <a:bodyPr wrap="none" lIns="91440" tIns="18288" rIns="91440" bIns="27432" rtlCol="0" anchor="ctr" anchorCtr="0">
+              <a:spAutoFit/>
+            </a:bodyPr>
+            <a:lstStyle/>
+            <a:p>
+              <a:r>
+                <a:rPr lang="pt-BR" sz="1200">
+                  <a:solidFill>
+                    <a:prstClr val="white"/>
+                  </a:solidFill>
+                  <a:latin typeface="Segoe UI" pitchFamily="34" charset="0"/>
+                  <a:ea typeface="Segoe UI" pitchFamily="34" charset="0"/>
+                  <a:cs typeface="Segoe UI" pitchFamily="34" charset="0"/>
+                </a:rPr>
+                <a:t>Web page title</a:t>
+              </a:r>
+            </a:p>
+          </p:txBody>
+        </p:sp>
+        <p:grpSp>
+          <p:nvGrpSpPr>
+            <p:cNvPr id="7" name="Group 4"/>
+            <p:cNvGrpSpPr/>
+            <p:nvPr/>
+          </p:nvGrpSpPr>
+          <p:grpSpPr>
+            <a:xfrm>
+              <a:off x="81598" y="286385"/>
+              <a:ext cx="320040" cy="316520"/>
+              <a:chOff x="72073" y="221749"/>
+              <a:chExt cx="320040" cy="316520"/>
+            </a:xfrm>
+          </p:grpSpPr>
+          <p:sp>
+            <p:nvSpPr>
+              <p:cNvPr id="31" name="Oval 28"/>
+              <p:cNvSpPr/>
+              <p:nvPr/>
+            </p:nvSpPr>
+            <p:spPr>
+              <a:xfrm>
+                <a:off x="72073" y="221749"/>
+                <a:ext cx="320040" cy="316520"/>
+              </a:xfrm>
+              <a:prstGeom prst="ellipse">
+                <a:avLst/>
+              </a:prstGeom>
+              <a:gradFill flip="none" rotWithShape="1">
+                <a:gsLst>
+                  <a:gs pos="91000">
+                    <a:srgbClr val="FFFFFF">
+                      <a:lumMod val="85000"/>
+                    </a:srgbClr>
+                  </a:gs>
+                  <a:gs pos="36000">
+                    <a:srgbClr val="FFFFFF">
+                      <a:lumMod val="95000"/>
+                    </a:srgbClr>
+                  </a:gs>
+                  <a:gs pos="100000">
+                    <a:srgbClr val="FFFFFF">
+                      <a:lumMod val="95000"/>
+                    </a:srgbClr>
+                  </a:gs>
+                </a:gsLst>
+                <a:lin ang="5400000" scaled="0"/>
+                <a:tileRect/>
+              </a:gradFill>
+              <a:ln w="3175">
+                <a:solidFill>
+                  <a:srgbClr val="000000">
+                    <a:lumMod val="50000"/>
+                    <a:lumOff val="50000"/>
+                  </a:srgbClr>
+                </a:solidFill>
+              </a:ln>
+              <a:effectLst/>
+            </p:spPr>
+            <p:style>
+              <a:lnRef idx="2">
+                <a:srgbClr val="4F81BD">
+                  <a:shade val="50000"/>
+                </a:srgbClr>
+              </a:lnRef>
+              <a:fillRef idx="1">
+                <a:srgbClr val="4F81BD"/>
+              </a:fillRef>
+              <a:effectRef idx="0">
+                <a:srgbClr val="4F81BD"/>
+              </a:effectRef>
+              <a:fontRef idx="minor">
+                <a:srgbClr val="000000"/>
+              </a:fontRef>
+            </p:style>
+            <p:txBody>
+              <a:bodyPr rtlCol="0" anchor="ctr"/>
+              <a:lstStyle/>
+              <a:p>
+                <a:pPr algn="ctr"/>
+                <a:endParaRPr lang="pt-BR" sz="1050" u="sng">
+                  <a:solidFill>
+                    <a:prstClr val="white"/>
+                  </a:solidFill>
+                </a:endParaRPr>
+              </a:p>
+            </p:txBody>
+          </p:sp>
+          <p:sp>
+            <p:nvSpPr>
+              <p:cNvPr id="32" name="Left Arrow 29"/>
+              <p:cNvSpPr/>
+              <p:nvPr/>
+            </p:nvSpPr>
+            <p:spPr>
+              <a:xfrm>
+                <a:off x="109358" y="275511"/>
+                <a:ext cx="223134" cy="208997"/>
+              </a:xfrm>
+              <a:prstGeom prst="leftArrow">
+                <a:avLst/>
+              </a:prstGeom>
+              <a:solidFill>
+                <a:sysClr val="window" lastClr="FFFFFF"/>
+              </a:solidFill>
+              <a:ln w="3175" cap="flat" cmpd="sng" algn="ctr">
+                <a:solidFill>
+                  <a:sysClr val="windowText" lastClr="000000">
+                    <a:lumMod val="75000"/>
+                    <a:lumOff val="25000"/>
+                  </a:sysClr>
+                </a:solidFill>
+                <a:prstDash val="solid"/>
+              </a:ln>
+              <a:effectLst/>
+            </p:spPr>
+            <p:txBody>
+              <a:bodyPr rtlCol="0" anchor="ctr"/>
+              <a:lstStyle/>
+              <a:p>
+                <a:pPr algn="ctr"/>
+                <a:endParaRPr lang="pt-BR" sz="1050" kern="0">
+                  <a:solidFill>
+                    <a:prstClr val="white"/>
+                  </a:solidFill>
+                  <a:latin typeface="Segoe UI"/>
+                </a:endParaRPr>
+              </a:p>
+            </p:txBody>
+          </p:sp>
+        </p:grpSp>
+        <p:grpSp>
+          <p:nvGrpSpPr>
+            <p:cNvPr id="8" name="Group 5"/>
+            <p:cNvGrpSpPr/>
+            <p:nvPr/>
+          </p:nvGrpSpPr>
+          <p:grpSpPr>
+            <a:xfrm>
+              <a:off x="453671" y="286384"/>
+              <a:ext cx="320040" cy="316520"/>
+              <a:chOff x="444146" y="221748"/>
+              <a:chExt cx="320040" cy="316520"/>
+            </a:xfrm>
+          </p:grpSpPr>
+          <p:sp>
+            <p:nvSpPr>
+              <p:cNvPr id="29" name="Oval 26"/>
+              <p:cNvSpPr/>
+              <p:nvPr/>
+            </p:nvSpPr>
+            <p:spPr>
+              <a:xfrm>
+                <a:off x="444146" y="221748"/>
+                <a:ext cx="320040" cy="316520"/>
+              </a:xfrm>
+              <a:prstGeom prst="ellipse">
+                <a:avLst/>
+              </a:prstGeom>
+              <a:gradFill flip="none" rotWithShape="1">
+                <a:gsLst>
+                  <a:gs pos="91000">
+                    <a:srgbClr val="FFFFFF">
+                      <a:lumMod val="85000"/>
+                    </a:srgbClr>
+                  </a:gs>
+                  <a:gs pos="36000">
+                    <a:srgbClr val="FFFFFF">
+                      <a:lumMod val="95000"/>
+                    </a:srgbClr>
+                  </a:gs>
+                  <a:gs pos="100000">
+                    <a:srgbClr val="FFFFFF">
+                      <a:lumMod val="95000"/>
+                    </a:srgbClr>
+                  </a:gs>
+                </a:gsLst>
+                <a:lin ang="5400000" scaled="0"/>
+                <a:tileRect/>
+              </a:gradFill>
+              <a:ln w="3175">
+                <a:solidFill>
+                  <a:srgbClr val="000000">
+                    <a:lumMod val="50000"/>
+                    <a:lumOff val="50000"/>
+                  </a:srgbClr>
+                </a:solidFill>
+              </a:ln>
+              <a:effectLst/>
+            </p:spPr>
+            <p:style>
+              <a:lnRef idx="2">
+                <a:srgbClr val="4F81BD">
+                  <a:shade val="50000"/>
+                </a:srgbClr>
+              </a:lnRef>
+              <a:fillRef idx="1">
+                <a:srgbClr val="4F81BD"/>
+              </a:fillRef>
+              <a:effectRef idx="0">
+                <a:srgbClr val="4F81BD"/>
+              </a:effectRef>
+              <a:fontRef idx="minor">
+                <a:srgbClr val="000000"/>
+              </a:fontRef>
+            </p:style>
+            <p:txBody>
+              <a:bodyPr rtlCol="0" anchor="ctr"/>
+              <a:lstStyle/>
+              <a:p>
+                <a:pPr algn="ctr"/>
+                <a:endParaRPr lang="pt-BR" sz="1050" u="sng">
+                  <a:solidFill>
+                    <a:prstClr val="white"/>
+                  </a:solidFill>
+                </a:endParaRPr>
+              </a:p>
+            </p:txBody>
+          </p:sp>
+          <p:sp>
+            <p:nvSpPr>
+              <p:cNvPr id="30" name="Right Arrow 27"/>
+              <p:cNvSpPr/>
+              <p:nvPr/>
+            </p:nvSpPr>
+            <p:spPr>
+              <a:xfrm>
+                <a:off x="481249" y="275509"/>
+                <a:ext cx="257146" cy="208999"/>
+              </a:xfrm>
+              <a:prstGeom prst="rightArrow">
+                <a:avLst/>
+              </a:prstGeom>
+              <a:solidFill>
+                <a:sysClr val="window" lastClr="FFFFFF"/>
+              </a:solidFill>
+              <a:ln w="3175" cap="flat" cmpd="sng" algn="ctr">
+                <a:solidFill>
+                  <a:sysClr val="windowText" lastClr="000000">
+                    <a:lumMod val="75000"/>
+                    <a:lumOff val="25000"/>
+                  </a:sysClr>
+                </a:solidFill>
+                <a:prstDash val="solid"/>
+              </a:ln>
+              <a:effectLst/>
+            </p:spPr>
+            <p:txBody>
+              <a:bodyPr rtlCol="0" anchor="ctr"/>
+              <a:lstStyle/>
+              <a:p>
+                <a:pPr algn="ctr"/>
+                <a:endParaRPr lang="pt-BR" sz="1050" kern="0">
+                  <a:solidFill>
+                    <a:prstClr val="white"/>
+                  </a:solidFill>
+                  <a:latin typeface="Segoe UI"/>
+                </a:endParaRPr>
+              </a:p>
+            </p:txBody>
+          </p:sp>
+        </p:grpSp>
+        <p:grpSp>
+          <p:nvGrpSpPr>
+            <p:cNvPr id="9" name="Minimize - Maximize - Close"/>
+            <p:cNvGrpSpPr/>
+            <p:nvPr/>
+          </p:nvGrpSpPr>
+          <p:grpSpPr>
+            <a:xfrm>
+              <a:off x="8632311" y="92599"/>
+              <a:ext cx="384527" cy="78032"/>
+              <a:chOff x="9347642" y="131588"/>
+              <a:chExt cx="384527" cy="78032"/>
+            </a:xfrm>
+          </p:grpSpPr>
+          <p:cxnSp>
+            <p:nvCxnSpPr>
+              <p:cNvPr id="24" name="Line"/>
+              <p:cNvCxnSpPr/>
+              <p:nvPr/>
+            </p:nvCxnSpPr>
+            <p:spPr>
+              <a:xfrm>
+                <a:off x="9661396" y="131588"/>
+                <a:ext cx="70773" cy="76200"/>
+              </a:xfrm>
+              <a:prstGeom prst="line">
+                <a:avLst/>
+              </a:prstGeom>
+              <a:ln w="12700">
+                <a:solidFill>
+                  <a:srgbClr val="FFFFFF"/>
+                </a:solidFill>
+              </a:ln>
+            </p:spPr>
+            <p:style>
+              <a:lnRef idx="1">
+                <a:srgbClr val="4F81BD"/>
+              </a:lnRef>
+              <a:fillRef idx="0">
+                <a:srgbClr val="4F81BD"/>
+              </a:fillRef>
+              <a:effectRef idx="0">
+                <a:srgbClr val="4F81BD"/>
+              </a:effectRef>
+              <a:fontRef idx="minor">
+                <a:srgbClr val="000000"/>
+              </a:fontRef>
+            </p:style>
+          </p:cxnSp>
+          <p:cxnSp>
+            <p:nvCxnSpPr>
+              <p:cNvPr id="25" name="Line"/>
+              <p:cNvCxnSpPr/>
+              <p:nvPr/>
+            </p:nvCxnSpPr>
+            <p:spPr>
+              <a:xfrm flipH="1">
+                <a:off x="9661395" y="131588"/>
+                <a:ext cx="70773" cy="76200"/>
+              </a:xfrm>
+              <a:prstGeom prst="line">
+                <a:avLst/>
+              </a:prstGeom>
+              <a:ln w="12700">
+                <a:solidFill>
+                  <a:srgbClr val="FFFFFF"/>
+                </a:solidFill>
+              </a:ln>
+            </p:spPr>
+            <p:style>
+              <a:lnRef idx="1">
+                <a:srgbClr val="4F81BD"/>
+              </a:lnRef>
+              <a:fillRef idx="0">
+                <a:srgbClr val="4F81BD"/>
+              </a:fillRef>
+              <a:effectRef idx="0">
+                <a:srgbClr val="4F81BD"/>
+              </a:effectRef>
+              <a:fontRef idx="minor">
+                <a:srgbClr val="000000"/>
+              </a:fontRef>
+            </p:style>
+          </p:cxnSp>
+          <p:sp>
+            <p:nvSpPr>
+              <p:cNvPr id="26" name="Line"/>
+              <p:cNvSpPr/>
+              <p:nvPr/>
+            </p:nvSpPr>
+            <p:spPr>
+              <a:xfrm rot="10800000" flipV="1">
+                <a:off x="9499472" y="143255"/>
+                <a:ext cx="91440" cy="9144"/>
+              </a:xfrm>
+              <a:prstGeom prst="rect">
+                <a:avLst/>
+              </a:prstGeom>
+              <a:solidFill>
+                <a:srgbClr val="919191"/>
+              </a:solidFill>
+              <a:ln w="3175">
+                <a:solidFill>
+                  <a:srgbClr val="FFFFFF"/>
+                </a:solidFill>
+              </a:ln>
+            </p:spPr>
+            <p:style>
+              <a:lnRef idx="2">
+                <a:srgbClr val="4F81BD">
+                  <a:shade val="50000"/>
+                </a:srgbClr>
+              </a:lnRef>
+              <a:fillRef idx="1001">
+                <a:srgbClr val="000000"/>
+              </a:fillRef>
+              <a:effectRef idx="0">
+                <a:srgbClr val="4F81BD"/>
+              </a:effectRef>
+              <a:fontRef idx="minor">
+                <a:srgbClr val="000000"/>
+              </a:fontRef>
+            </p:style>
+            <p:txBody>
+              <a:bodyPr rtlCol="0" anchor="ctr"/>
+              <a:lstStyle/>
+              <a:p>
+                <a:pPr algn="ctr"/>
+                <a:endParaRPr lang="pt-BR" sz="1050">
+                  <a:solidFill>
+                    <a:prstClr val="white"/>
+                  </a:solidFill>
+                </a:endParaRPr>
+              </a:p>
+            </p:txBody>
+          </p:sp>
+          <p:sp>
+            <p:nvSpPr>
+              <p:cNvPr id="27" name="Line"/>
+              <p:cNvSpPr/>
+              <p:nvPr/>
+            </p:nvSpPr>
+            <p:spPr>
+              <a:xfrm rot="10800000" flipV="1">
+                <a:off x="9498658" y="135261"/>
+                <a:ext cx="91440" cy="72527"/>
+              </a:xfrm>
+              <a:prstGeom prst="rect">
+                <a:avLst/>
+              </a:prstGeom>
+              <a:noFill/>
+              <a:ln w="12700">
+                <a:solidFill>
+                  <a:srgbClr val="FFFFFF"/>
+                </a:solidFill>
+              </a:ln>
+            </p:spPr>
+            <p:style>
+              <a:lnRef idx="2">
+                <a:srgbClr val="4F81BD">
+                  <a:shade val="50000"/>
+                </a:srgbClr>
+              </a:lnRef>
+              <a:fillRef idx="1001">
+                <a:srgbClr val="000000"/>
+              </a:fillRef>
+              <a:effectRef idx="0">
+                <a:srgbClr val="4F81BD"/>
+              </a:effectRef>
+              <a:fontRef idx="minor">
+                <a:srgbClr val="000000"/>
+              </a:fontRef>
+            </p:style>
+            <p:txBody>
+              <a:bodyPr rtlCol="0" anchor="ctr"/>
+              <a:lstStyle/>
+              <a:p>
+                <a:pPr algn="ctr"/>
+                <a:endParaRPr lang="pt-BR" sz="1050">
+                  <a:solidFill>
+                    <a:prstClr val="white"/>
+                  </a:solidFill>
+                </a:endParaRPr>
+              </a:p>
+            </p:txBody>
+          </p:sp>
+          <p:sp>
+            <p:nvSpPr>
+              <p:cNvPr id="28" name="Line"/>
+              <p:cNvSpPr/>
+              <p:nvPr/>
+            </p:nvSpPr>
+            <p:spPr>
+              <a:xfrm rot="10800000" flipV="1">
+                <a:off x="9347642" y="200476"/>
+                <a:ext cx="91440" cy="9144"/>
+              </a:xfrm>
+              <a:prstGeom prst="rect">
+                <a:avLst/>
+              </a:prstGeom>
+              <a:solidFill>
+                <a:srgbClr val="919191"/>
+              </a:solidFill>
+              <a:ln w="3175">
+                <a:solidFill>
+                  <a:srgbClr val="FFFFFF"/>
+                </a:solidFill>
+              </a:ln>
+            </p:spPr>
+            <p:style>
+              <a:lnRef idx="2">
+                <a:srgbClr val="4F81BD">
+                  <a:shade val="50000"/>
+                </a:srgbClr>
+              </a:lnRef>
+              <a:fillRef idx="1001">
+                <a:srgbClr val="000000"/>
+              </a:fillRef>
+              <a:effectRef idx="0">
+                <a:srgbClr val="4F81BD"/>
+              </a:effectRef>
+              <a:fontRef idx="minor">
+                <a:srgbClr val="000000"/>
+              </a:fontRef>
+            </p:style>
+            <p:txBody>
+              <a:bodyPr rtlCol="0" anchor="ctr"/>
+              <a:lstStyle/>
+              <a:p>
+                <a:pPr algn="ctr"/>
+                <a:endParaRPr lang="pt-BR" sz="1050">
+                  <a:solidFill>
+                    <a:prstClr val="white"/>
+                  </a:solidFill>
+                </a:endParaRPr>
+              </a:p>
+            </p:txBody>
+          </p:sp>
+        </p:grpSp>
+        <p:sp>
+          <p:nvSpPr>
+            <p:cNvPr id="10" name="WebPageBody"/>
+            <p:cNvSpPr/>
+            <p:nvPr/>
+          </p:nvSpPr>
+          <p:spPr>
+            <a:xfrm>
+              <a:off x="76200" y="685159"/>
+              <a:ext cx="8991600" cy="6066801"/>
+            </a:xfrm>
+            <a:prstGeom prst="rect">
+              <a:avLst/>
+            </a:prstGeom>
+            <a:solidFill>
+              <a:sysClr val="window" lastClr="FFFFFF"/>
+            </a:solidFill>
+            <a:ln w="3175" cap="flat" cmpd="sng" algn="ctr">
+              <a:solidFill>
+                <a:srgbClr val="000000">
+                  <a:lumMod val="50000"/>
+                  <a:lumOff val="50000"/>
+                </a:srgbClr>
+              </a:solidFill>
+              <a:prstDash val="solid"/>
+            </a:ln>
+            <a:effectLst/>
+          </p:spPr>
+          <p:txBody>
+            <a:bodyPr rtlCol="0" anchor="ctr"/>
+            <a:lstStyle/>
+            <a:p>
+              <a:pPr algn="ctr"/>
+              <a:endParaRPr lang="pt-BR" sz="1050" kern="0">
+                <a:solidFill>
+                  <a:prstClr val="white"/>
+                </a:solidFill>
+                <a:latin typeface="Segoe UI"/>
+              </a:endParaRPr>
+            </a:p>
+          </p:txBody>
+        </p:sp>
+        <p:grpSp>
+          <p:nvGrpSpPr>
+            <p:cNvPr id="11" name="Group 8"/>
+            <p:cNvGrpSpPr/>
+            <p:nvPr/>
+          </p:nvGrpSpPr>
+          <p:grpSpPr>
+            <a:xfrm>
+              <a:off x="8386335" y="360579"/>
+              <a:ext cx="640645" cy="183940"/>
+              <a:chOff x="8303527" y="360579"/>
+              <a:chExt cx="640645" cy="183940"/>
+            </a:xfrm>
+          </p:grpSpPr>
+          <p:pic>
+            <p:nvPicPr>
+              <p:cNvPr id="21" name="Picture 2" descr="C:\Users\t-dantay\Documents\Placeholders\home.png"/>
+              <p:cNvPicPr>
+                <a:picLocks noChangeAspect="1" noChangeArrowheads="1"/>
+              </p:cNvPicPr>
+              <p:nvPr/>
+            </p:nvPicPr>
+            <p:blipFill>
+              <a:blip r:embed="rId11" cstate="print">
+                <a:extLst>
+                  <a:ext uri="{28A0092B-C50C-407E-A947-70E740481C1C}">
+                    <a14:useLocalDpi xmlns:a14="http://schemas.microsoft.com/office/drawing/2010/main" val="0"/>
+                  </a:ext>
+                </a:extLst>
+              </a:blip>
+              <a:srcRect/>
+              <a:stretch>
+                <a:fillRect/>
+              </a:stretch>
+            </p:blipFill>
+            <p:spPr bwMode="auto">
+              <a:xfrm>
+                <a:off x="8303527" y="361109"/>
+                <a:ext cx="185783" cy="182880"/>
+              </a:xfrm>
+              <a:prstGeom prst="rect">
+                <a:avLst/>
+              </a:prstGeom>
+              <a:noFill/>
+              <a:extLst>
+                <a:ext uri="{909E8E84-426E-40DD-AFC4-6F175D3DCCD1}">
+                  <a14:hiddenFill xmlns:a14="http://schemas.microsoft.com/office/drawing/2010/main">
+                    <a:solidFill>
+                      <a:srgbClr val="FFFFFF"/>
+                    </a:solidFill>
+                  </a14:hiddenFill>
+                </a:ext>
+              </a:extLst>
+            </p:spPr>
+          </p:pic>
+          <p:pic>
+            <p:nvPicPr>
+              <p:cNvPr id="22" name="Picture 2" descr="C:\Users\t-dantay\Documents\Placeholders\setting.png"/>
+              <p:cNvPicPr>
+                <a:picLocks noChangeAspect="1" noChangeArrowheads="1"/>
+              </p:cNvPicPr>
+              <p:nvPr/>
+            </p:nvPicPr>
+            <p:blipFill rotWithShape="1">
+              <a:blip r:embed="rId12" cstate="print">
+                <a:extLst>
+                  <a:ext uri="{28A0092B-C50C-407E-A947-70E740481C1C}">
+                    <a14:useLocalDpi xmlns:a14="http://schemas.microsoft.com/office/drawing/2010/main" val="0"/>
+                  </a:ext>
+                </a:extLst>
+              </a:blip>
+              <a:srcRect t="13480" r="35484"/>
+              <a:stretch/>
+            </p:blipFill>
+            <p:spPr bwMode="auto">
+              <a:xfrm>
+                <a:off x="8761292" y="360579"/>
+                <a:ext cx="182880" cy="183940"/>
+              </a:xfrm>
+              <a:prstGeom prst="rect">
+                <a:avLst/>
+              </a:prstGeom>
+              <a:noFill/>
+              <a:extLst>
+                <a:ext uri="{909E8E84-426E-40DD-AFC4-6F175D3DCCD1}">
+                  <a14:hiddenFill xmlns:a14="http://schemas.microsoft.com/office/drawing/2010/main">
+                    <a:solidFill>
+                      <a:srgbClr val="FFFFFF"/>
+                    </a:solidFill>
+                  </a14:hiddenFill>
+                </a:ext>
+              </a:extLst>
+            </p:spPr>
+          </p:pic>
+          <p:pic>
+            <p:nvPicPr>
+              <p:cNvPr id="23" name="Picture 2" descr="C:\Users\t-dantay\Documents\Placeholders\star.png"/>
+              <p:cNvPicPr>
+                <a:picLocks noChangeAspect="1" noChangeArrowheads="1"/>
+              </p:cNvPicPr>
+              <p:nvPr/>
+            </p:nvPicPr>
+            <p:blipFill>
+              <a:blip r:embed="rId13" cstate="print">
+                <a:extLst>
+                  <a:ext uri="{28A0092B-C50C-407E-A947-70E740481C1C}">
+                    <a14:useLocalDpi xmlns:a14="http://schemas.microsoft.com/office/drawing/2010/main" val="0"/>
+                  </a:ext>
+                </a:extLst>
+              </a:blip>
+              <a:srcRect/>
+              <a:stretch>
+                <a:fillRect/>
+              </a:stretch>
+            </p:blipFill>
+            <p:spPr bwMode="auto">
+              <a:xfrm>
+                <a:off x="8529364" y="361109"/>
+                <a:ext cx="191874" cy="182880"/>
+              </a:xfrm>
+              <a:prstGeom prst="rect">
+                <a:avLst/>
+              </a:prstGeom>
+              <a:noFill/>
+              <a:extLst>
+                <a:ext uri="{909E8E84-426E-40DD-AFC4-6F175D3DCCD1}">
+                  <a14:hiddenFill xmlns:a14="http://schemas.microsoft.com/office/drawing/2010/main">
+                    <a:solidFill>
+                      <a:srgbClr val="FFFFFF"/>
+                    </a:solidFill>
+                  </a14:hiddenFill>
+                </a:ext>
+              </a:extLst>
+            </p:spPr>
+          </p:pic>
+        </p:grpSp>
+        <p:grpSp>
+          <p:nvGrpSpPr>
+            <p:cNvPr id="12" name="Group 9"/>
+            <p:cNvGrpSpPr/>
+            <p:nvPr/>
+          </p:nvGrpSpPr>
+          <p:grpSpPr>
+            <a:xfrm>
+              <a:off x="923925" y="340846"/>
+              <a:ext cx="7142930" cy="228600"/>
+              <a:chOff x="923925" y="340846"/>
+              <a:chExt cx="7142930" cy="228600"/>
+            </a:xfrm>
+          </p:grpSpPr>
+          <p:sp>
+            <p:nvSpPr>
+              <p:cNvPr id="13" name="UrlBar"/>
+              <p:cNvSpPr/>
+              <p:nvPr/>
+            </p:nvSpPr>
+            <p:spPr>
+              <a:xfrm>
+                <a:off x="923925" y="340846"/>
+                <a:ext cx="7142930" cy="228600"/>
+              </a:xfrm>
+              <a:prstGeom prst="rect">
+                <a:avLst/>
+              </a:prstGeom>
+              <a:solidFill>
+                <a:sysClr val="window" lastClr="FFFFFF"/>
+              </a:solidFill>
+              <a:ln w="3175" cap="flat" cmpd="sng" algn="ctr">
+                <a:solidFill>
+                  <a:srgbClr val="000000">
+                    <a:lumMod val="50000"/>
+                    <a:lumOff val="50000"/>
+                  </a:srgbClr>
+                </a:solidFill>
+                <a:prstDash val="solid"/>
+              </a:ln>
+              <a:effectLst/>
+            </p:spPr>
+            <p:txBody>
+              <a:bodyPr rtlCol="0" anchor="ctr"/>
+              <a:lstStyle/>
+              <a:p>
+                <a:endParaRPr lang="pt-BR" sz="1200" kern="0">
+                  <a:solidFill>
+                    <a:prstClr val="black">
+                      <a:lumMod val="75000"/>
+                      <a:lumOff val="25000"/>
+                    </a:prstClr>
+                  </a:solidFill>
+                  <a:latin typeface="Segoe UI"/>
+                </a:endParaRPr>
+              </a:p>
+            </p:txBody>
+          </p:sp>
+          <p:grpSp>
+            <p:nvGrpSpPr>
+              <p:cNvPr id="14" name="Group 11"/>
+              <p:cNvGrpSpPr/>
+              <p:nvPr/>
+            </p:nvGrpSpPr>
+            <p:grpSpPr>
+              <a:xfrm>
+                <a:off x="7260350" y="363706"/>
+                <a:ext cx="744325" cy="182880"/>
+                <a:chOff x="7260350" y="363706"/>
+                <a:chExt cx="744325" cy="182880"/>
+              </a:xfrm>
+            </p:grpSpPr>
+            <p:pic>
+              <p:nvPicPr>
+                <p:cNvPr id="15" name="Search" descr="C:\Users\t-dantay\Documents\Placeholders\search.png"/>
+                <p:cNvPicPr>
+                  <a:picLocks noChangeAspect="1" noChangeArrowheads="1"/>
+                </p:cNvPicPr>
+                <p:nvPr/>
+              </p:nvPicPr>
+              <p:blipFill>
+                <a:blip r:embed="rId14" cstate="print">
+                  <a:extLst>
+                    <a:ext uri="{28A0092B-C50C-407E-A947-70E740481C1C}">
+                      <a14:useLocalDpi xmlns:a14="http://schemas.microsoft.com/office/drawing/2010/main" val="0"/>
+                    </a:ext>
+                  </a:extLst>
+                </a:blip>
+                <a:srcRect/>
+                <a:stretch>
+                  <a:fillRect/>
+                </a:stretch>
+              </p:blipFill>
+              <p:spPr bwMode="auto">
+                <a:xfrm flipH="1">
+                  <a:off x="7260350" y="363706"/>
+                  <a:ext cx="182880" cy="182880"/>
+                </a:xfrm>
+                <a:prstGeom prst="rect">
+                  <a:avLst/>
+                </a:prstGeom>
+                <a:noFill/>
+                <a:extLst>
+                  <a:ext uri="{909E8E84-426E-40DD-AFC4-6F175D3DCCD1}">
+                    <a14:hiddenFill xmlns:a14="http://schemas.microsoft.com/office/drawing/2010/main">
+                      <a:solidFill>
+                        <a:srgbClr val="FFFFFF"/>
+                      </a:solidFill>
+                    </a14:hiddenFill>
+                  </a:ext>
+                </a:extLst>
+              </p:spPr>
+            </p:pic>
+            <p:pic>
+              <p:nvPicPr>
+                <p:cNvPr id="16" name="Refresh" descr="C:\Users\t-dantay\Documents\First24\arrowrepeat1.png"/>
+                <p:cNvPicPr>
+                  <a:picLocks noChangeAspect="1" noChangeArrowheads="1"/>
+                </p:cNvPicPr>
+                <p:nvPr/>
+              </p:nvPicPr>
+              <p:blipFill>
+                <a:blip r:embed="rId15" cstate="print">
+                  <a:extLst>
+                    <a:ext uri="{28A0092B-C50C-407E-A947-70E740481C1C}">
+                      <a14:useLocalDpi xmlns:a14="http://schemas.microsoft.com/office/drawing/2010/main" val="0"/>
+                    </a:ext>
+                  </a:extLst>
+                </a:blip>
+                <a:srcRect/>
+                <a:stretch>
+                  <a:fillRect/>
+                </a:stretch>
+              </p:blipFill>
+              <p:spPr bwMode="auto">
+                <a:xfrm>
+                  <a:off x="7644400" y="363706"/>
+                  <a:ext cx="182880" cy="182880"/>
+                </a:xfrm>
+                <a:prstGeom prst="rect">
+                  <a:avLst/>
+                </a:prstGeom>
+                <a:noFill/>
+                <a:extLst>
+                  <a:ext uri="{909E8E84-426E-40DD-AFC4-6F175D3DCCD1}">
+                    <a14:hiddenFill xmlns:a14="http://schemas.microsoft.com/office/drawing/2010/main">
+                      <a:solidFill>
+                        <a:srgbClr val="FFFFFF"/>
+                      </a:solidFill>
+                    </a14:hiddenFill>
+                  </a:ext>
+                </a:extLst>
+              </p:spPr>
+            </p:pic>
+            <p:pic>
+              <p:nvPicPr>
+                <p:cNvPr id="17" name="Drop Down" descr="C:\Users\t-dantay\Documents\First24\arrowsimple1.png"/>
+                <p:cNvPicPr>
+                  <a:picLocks noChangeAspect="1" noChangeArrowheads="1"/>
+                </p:cNvPicPr>
+                <p:nvPr/>
+              </p:nvPicPr>
+              <p:blipFill>
+                <a:blip r:embed="rId16" cstate="print">
+                  <a:extLst>
+                    <a:ext uri="{28A0092B-C50C-407E-A947-70E740481C1C}">
+                      <a14:useLocalDpi xmlns:a14="http://schemas.microsoft.com/office/drawing/2010/main" val="0"/>
+                    </a:ext>
+                  </a:extLst>
+                </a:blip>
+                <a:srcRect/>
+                <a:stretch>
+                  <a:fillRect/>
+                </a:stretch>
+              </p:blipFill>
+              <p:spPr bwMode="auto">
+                <a:xfrm rot="5400000">
+                  <a:off x="7476150" y="409426"/>
+                  <a:ext cx="91440" cy="91440"/>
+                </a:xfrm>
+                <a:prstGeom prst="rect">
+                  <a:avLst/>
+                </a:prstGeom>
+                <a:noFill/>
+                <a:extLst>
+                  <a:ext uri="{909E8E84-426E-40DD-AFC4-6F175D3DCCD1}">
+                    <a14:hiddenFill xmlns:a14="http://schemas.microsoft.com/office/drawing/2010/main">
+                      <a:solidFill>
+                        <a:srgbClr val="FFFFFF"/>
+                      </a:solidFill>
+                    </a14:hiddenFill>
+                  </a:ext>
+                </a:extLst>
+              </p:spPr>
+            </p:pic>
+            <p:grpSp>
+              <p:nvGrpSpPr>
+                <p:cNvPr id="18" name="X"/>
+                <p:cNvGrpSpPr/>
+                <p:nvPr/>
+              </p:nvGrpSpPr>
+              <p:grpSpPr>
+                <a:xfrm>
+                  <a:off x="7913235" y="409426"/>
+                  <a:ext cx="91440" cy="91440"/>
+                  <a:chOff x="4687215" y="1739180"/>
+                  <a:chExt cx="91440" cy="91440"/>
+                </a:xfrm>
+              </p:grpSpPr>
+              <p:cxnSp>
+                <p:nvCxnSpPr>
+                  <p:cNvPr id="19" name="Straight Connector 16"/>
+                  <p:cNvCxnSpPr/>
+                  <p:nvPr/>
+                </p:nvCxnSpPr>
+                <p:spPr>
+                  <a:xfrm flipV="1">
+                    <a:off x="4687215" y="1739180"/>
+                    <a:ext cx="91440" cy="91440"/>
+                  </a:xfrm>
+                  <a:prstGeom prst="line">
+                    <a:avLst/>
+                  </a:prstGeom>
+                  <a:ln w="28575">
+                    <a:solidFill>
+                      <a:srgbClr val="FFFFFF">
+                        <a:lumMod val="50000"/>
+                      </a:srgbClr>
+                    </a:solidFill>
+                  </a:ln>
+                </p:spPr>
+                <p:style>
+                  <a:lnRef idx="1">
+                    <a:srgbClr val="FFFFFF"/>
+                  </a:lnRef>
+                  <a:fillRef idx="0">
+                    <a:srgbClr val="FFFFFF"/>
+                  </a:fillRef>
+                  <a:effectRef idx="0">
+                    <a:srgbClr val="FFFFFF"/>
+                  </a:effectRef>
+                  <a:fontRef idx="minor">
+                    <a:srgbClr val="000000"/>
+                  </a:fontRef>
+                </p:style>
+              </p:cxnSp>
+              <p:cxnSp>
+                <p:nvCxnSpPr>
+                  <p:cNvPr id="20" name="Straight Connector 17"/>
+                  <p:cNvCxnSpPr/>
+                  <p:nvPr/>
+                </p:nvCxnSpPr>
+                <p:spPr>
+                  <a:xfrm>
+                    <a:off x="4687215" y="1739180"/>
+                    <a:ext cx="91440" cy="91440"/>
+                  </a:xfrm>
+                  <a:prstGeom prst="line">
+                    <a:avLst/>
+                  </a:prstGeom>
+                  <a:ln w="28575">
+                    <a:solidFill>
+                      <a:srgbClr val="FFFFFF">
+                        <a:lumMod val="50000"/>
+                      </a:srgbClr>
+                    </a:solidFill>
+                  </a:ln>
+                </p:spPr>
+                <p:style>
+                  <a:lnRef idx="1">
+                    <a:srgbClr val="FFFFFF"/>
+                  </a:lnRef>
+                  <a:fillRef idx="0">
+                    <a:srgbClr val="FFFFFF"/>
+                  </a:fillRef>
+                  <a:effectRef idx="0">
+                    <a:srgbClr val="FFFFFF"/>
+                  </a:effectRef>
+                  <a:fontRef idx="minor">
+                    <a:srgbClr val="000000"/>
+                  </a:fontRef>
+                </p:style>
+              </p:cxnSp>
+            </p:grpSp>
+          </p:grpSp>
+        </p:grpSp>
+      </p:grpSp>
+      <p:sp>
+        <p:nvSpPr>
+          <p:cNvPr id="33" name="Retângulo: Cantos Arredondados 32"/>
+          <p:cNvSpPr/>
+          <p:nvPr/>
+        </p:nvSpPr>
+        <p:spPr>
+          <a:xfrm>
+            <a:off x="3532593" y="1973579"/>
+            <a:ext cx="4922520" cy="3489960"/>
+          </a:xfrm>
+          <a:prstGeom prst="roundRect">
+            <a:avLst/>
+          </a:prstGeom>
+          <a:noFill/>
+          <a:ln>
+            <a:solidFill>
+              <a:schemeClr val="bg1"/>
+            </a:solidFill>
+          </a:ln>
+          <a:effectLst>
+            <a:outerShdw blurRad="50800" dir="2700000" sx="101000" sy="101000" algn="tl" rotWithShape="0">
+              <a:schemeClr val="tx1">
+                <a:alpha val="66000"/>
+              </a:schemeClr>
+            </a:outerShdw>
+          </a:effectLst>
+        </p:spPr>
+        <p:style>
+          <a:lnRef idx="2">
+            <a:schemeClr val="accent1">
+              <a:shade val="50000"/>
+            </a:schemeClr>
+          </a:lnRef>
+          <a:fillRef idx="1">
+            <a:schemeClr val="accent1"/>
+          </a:fillRef>
+          <a:effectRef idx="0">
+            <a:schemeClr val="accent1"/>
+          </a:effectRef>
+          <a:fontRef idx="minor">
+            <a:schemeClr val="lt1"/>
+          </a:fontRef>
+        </p:style>
+        <p:txBody>
+          <a:bodyPr rtlCol="0" anchor="ctr"/>
+          <a:lstStyle/>
+          <a:p>
+            <a:pPr algn="ctr"/>
+            <a:endParaRPr lang="pt-BR">
+              <a:solidFill>
+                <a:schemeClr val="tx1"/>
+              </a:solidFill>
+            </a:endParaRPr>
+          </a:p>
+        </p:txBody>
+      </p:sp>
+      <p:sp>
+        <p:nvSpPr>
+          <p:cNvPr id="34" name="Content"/>
+          <p:cNvSpPr/>
+          <p:nvPr>
+            <p:custDataLst>
+              <p:custData r:id="rId2"/>
+            </p:custDataLst>
+          </p:nvPr>
+        </p:nvSpPr>
+        <p:spPr>
+          <a:xfrm>
+            <a:off x="5383802" y="3604259"/>
+            <a:ext cx="1220102" cy="228600"/>
+          </a:xfrm>
+          <a:prstGeom prst="rect">
+            <a:avLst/>
+          </a:prstGeom>
+          <a:solidFill>
+            <a:sysClr val="window" lastClr="FFFFFF"/>
+          </a:solidFill>
+          <a:ln w="3175">
+            <a:solidFill>
+              <a:srgbClr val="000000">
+                <a:lumMod val="50000"/>
+                <a:lumOff val="50000"/>
+              </a:srgbClr>
+            </a:solidFill>
+          </a:ln>
+          <a:effectLst/>
+        </p:spPr>
+        <p:style>
+          <a:lnRef idx="2">
+            <a:srgbClr val="4F81BD">
+              <a:shade val="50000"/>
+            </a:srgbClr>
+          </a:lnRef>
+          <a:fillRef idx="1">
+            <a:srgbClr val="4F81BD"/>
+          </a:fillRef>
+          <a:effectRef idx="0">
+            <a:srgbClr val="4F81BD"/>
+          </a:effectRef>
+          <a:fontRef idx="minor">
+            <a:srgbClr val="000000"/>
+          </a:fontRef>
+        </p:style>
+        <p:txBody>
+          <a:bodyPr wrap="none" lIns="45720" tIns="18288" rIns="45720" bIns="18288" rtlCol="0" anchor="ctr">
+            <a:noAutofit/>
+          </a:bodyPr>
+          <a:lstStyle/>
+          <a:p>
+            <a:endParaRPr lang="en-US" sz="1200" dirty="0">
+              <a:solidFill>
+                <a:srgbClr val="000000"/>
+              </a:solidFill>
+              <a:latin typeface="Segoe UI" pitchFamily="34" charset="0"/>
+              <a:cs typeface="Segoe UI" pitchFamily="34" charset="0"/>
+            </a:endParaRPr>
+          </a:p>
+        </p:txBody>
+      </p:sp>
+      <p:sp>
+        <p:nvSpPr>
+          <p:cNvPr id="35" name="Content"/>
+          <p:cNvSpPr/>
+          <p:nvPr>
+            <p:custDataLst>
+              <p:custData r:id="rId3"/>
+            </p:custDataLst>
+          </p:nvPr>
+        </p:nvSpPr>
+        <p:spPr>
+          <a:xfrm>
+            <a:off x="5373577" y="3915113"/>
+            <a:ext cx="1220102" cy="228600"/>
+          </a:xfrm>
+          <a:prstGeom prst="rect">
+            <a:avLst/>
+          </a:prstGeom>
+          <a:solidFill>
+            <a:sysClr val="window" lastClr="FFFFFF"/>
+          </a:solidFill>
+          <a:ln w="3175">
+            <a:solidFill>
+              <a:srgbClr val="000000">
+                <a:lumMod val="50000"/>
+                <a:lumOff val="50000"/>
+              </a:srgbClr>
+            </a:solidFill>
+          </a:ln>
+          <a:effectLst/>
+        </p:spPr>
+        <p:style>
+          <a:lnRef idx="2">
+            <a:srgbClr val="4F81BD">
+              <a:shade val="50000"/>
+            </a:srgbClr>
+          </a:lnRef>
+          <a:fillRef idx="1">
+            <a:srgbClr val="4F81BD"/>
+          </a:fillRef>
+          <a:effectRef idx="0">
+            <a:srgbClr val="4F81BD"/>
+          </a:effectRef>
+          <a:fontRef idx="minor">
+            <a:srgbClr val="000000"/>
+          </a:fontRef>
+        </p:style>
+        <p:txBody>
+          <a:bodyPr wrap="none" lIns="45720" tIns="18288" rIns="45720" bIns="18288" rtlCol="0" anchor="ctr">
+            <a:noAutofit/>
+          </a:bodyPr>
+          <a:lstStyle/>
+          <a:p>
+            <a:endParaRPr lang="en-US" sz="1200" dirty="0">
+              <a:solidFill>
+                <a:srgbClr val="000000"/>
+              </a:solidFill>
+              <a:latin typeface="Segoe UI" pitchFamily="34" charset="0"/>
+              <a:cs typeface="Segoe UI" pitchFamily="34" charset="0"/>
+            </a:endParaRPr>
+          </a:p>
+        </p:txBody>
+      </p:sp>
+      <p:sp>
+        <p:nvSpPr>
+          <p:cNvPr id="36" name="Content"/>
+          <p:cNvSpPr/>
+          <p:nvPr>
+            <p:custDataLst>
+              <p:custData r:id="rId4"/>
+            </p:custDataLst>
+          </p:nvPr>
+        </p:nvSpPr>
+        <p:spPr>
+          <a:xfrm>
+            <a:off x="5446893" y="4468019"/>
+            <a:ext cx="1106592" cy="228600"/>
+          </a:xfrm>
+          <a:prstGeom prst="roundRect">
+            <a:avLst/>
+          </a:prstGeom>
+          <a:solidFill>
+            <a:srgbClr val="FFFFFF">
+              <a:lumMod val="95000"/>
+            </a:srgbClr>
+          </a:solidFill>
+          <a:ln w="3175">
+            <a:solidFill>
+              <a:srgbClr val="000000">
+                <a:lumMod val="50000"/>
+                <a:lumOff val="50000"/>
+              </a:srgbClr>
+            </a:solidFill>
+          </a:ln>
+          <a:effectLst/>
+        </p:spPr>
+        <p:style>
+          <a:lnRef idx="2">
+            <a:srgbClr val="4F81BD">
+              <a:shade val="50000"/>
+            </a:srgbClr>
+          </a:lnRef>
+          <a:fillRef idx="1">
+            <a:srgbClr val="4F81BD"/>
+          </a:fillRef>
+          <a:effectRef idx="0">
+            <a:srgbClr val="4F81BD"/>
+          </a:effectRef>
+          <a:fontRef idx="minor">
+            <a:srgbClr val="000000"/>
+          </a:fontRef>
+        </p:style>
+        <p:txBody>
+          <a:bodyPr wrap="square" lIns="91440" tIns="0" rIns="91440" bIns="9144" rtlCol="0" anchor="ctr">
+            <a:noAutofit/>
+          </a:bodyPr>
+          <a:lstStyle/>
+          <a:p>
+            <a:pPr algn="ctr"/>
+            <a:r>
+              <a:rPr lang="pt-BR" sz="1200" dirty="0">
+                <a:latin typeface="Segoe UI" pitchFamily="34" charset="0"/>
+                <a:cs typeface="Segoe UI" pitchFamily="34" charset="0"/>
+              </a:rPr>
+              <a:t>Acessar</a:t>
+            </a:r>
+          </a:p>
+        </p:txBody>
+      </p:sp>
+      <p:sp>
+        <p:nvSpPr>
+          <p:cNvPr id="37" name="Content"/>
+          <p:cNvSpPr txBox="1"/>
+          <p:nvPr>
+            <p:custDataLst>
+              <p:custData r:id="rId5"/>
+            </p:custDataLst>
+          </p:nvPr>
+        </p:nvSpPr>
+        <p:spPr>
+          <a:xfrm>
+            <a:off x="4867087" y="3602027"/>
+            <a:ext cx="561372" cy="230832"/>
+          </a:xfrm>
+          <a:prstGeom prst="rect">
+            <a:avLst/>
+          </a:prstGeom>
+          <a:noFill/>
+        </p:spPr>
+        <p:txBody>
+          <a:bodyPr wrap="none" lIns="91440" tIns="18288" rIns="91440" bIns="27432" rtlCol="0" anchor="ctr" anchorCtr="0">
+            <a:spAutoFit/>
+          </a:bodyPr>
+          <a:lstStyle/>
+          <a:p>
+            <a:r>
+              <a:rPr lang="en-US" sz="1200" dirty="0">
+                <a:solidFill>
+                  <a:srgbClr val="000000"/>
+                </a:solidFill>
+                <a:latin typeface="Segoe UI" pitchFamily="34" charset="0"/>
+                <a:ea typeface="Segoe UI" pitchFamily="34" charset="0"/>
+                <a:cs typeface="Segoe UI" pitchFamily="34" charset="0"/>
+              </a:rPr>
+              <a:t>Login</a:t>
+            </a:r>
+          </a:p>
+        </p:txBody>
+      </p:sp>
+      <p:sp>
+        <p:nvSpPr>
+          <p:cNvPr id="38" name="Content"/>
+          <p:cNvSpPr txBox="1"/>
+          <p:nvPr>
+            <p:custDataLst>
+              <p:custData r:id="rId6"/>
+            </p:custDataLst>
+          </p:nvPr>
+        </p:nvSpPr>
+        <p:spPr>
+          <a:xfrm>
+            <a:off x="4848652" y="3927468"/>
+            <a:ext cx="598241" cy="230832"/>
+          </a:xfrm>
+          <a:prstGeom prst="rect">
+            <a:avLst/>
+          </a:prstGeom>
+          <a:noFill/>
+        </p:spPr>
+        <p:txBody>
+          <a:bodyPr wrap="none" lIns="91440" tIns="18288" rIns="91440" bIns="27432" rtlCol="0" anchor="ctr" anchorCtr="0">
+            <a:spAutoFit/>
+          </a:bodyPr>
+          <a:lstStyle/>
+          <a:p>
+            <a:r>
+              <a:rPr lang="pt-BR" sz="1200" dirty="0">
+                <a:solidFill>
+                  <a:srgbClr val="000000"/>
+                </a:solidFill>
+                <a:latin typeface="Segoe UI" pitchFamily="34" charset="0"/>
+                <a:ea typeface="Segoe UI" pitchFamily="34" charset="0"/>
+                <a:cs typeface="Segoe UI" pitchFamily="34" charset="0"/>
+              </a:rPr>
+              <a:t>Senha</a:t>
+            </a:r>
+          </a:p>
+        </p:txBody>
+      </p:sp>
+      <p:sp>
+        <p:nvSpPr>
+          <p:cNvPr id="39" name="Content"/>
+          <p:cNvSpPr txBox="1"/>
+          <p:nvPr>
+            <p:custDataLst>
+              <p:custData r:id="rId7"/>
+            </p:custDataLst>
+          </p:nvPr>
+        </p:nvSpPr>
+        <p:spPr>
+          <a:xfrm>
+            <a:off x="5297544" y="4122906"/>
+            <a:ext cx="1596912" cy="230832"/>
+          </a:xfrm>
+          <a:prstGeom prst="rect">
+            <a:avLst/>
+          </a:prstGeom>
+          <a:noFill/>
+        </p:spPr>
+        <p:txBody>
+          <a:bodyPr wrap="none" lIns="91440" tIns="18288" rIns="91440" bIns="27432" rtlCol="0" anchor="ctr" anchorCtr="0">
+            <a:spAutoFit/>
+          </a:bodyPr>
+          <a:lstStyle/>
+          <a:p>
+            <a:r>
+              <a:rPr lang="pt-BR" sz="1200" dirty="0">
+                <a:solidFill>
+                  <a:srgbClr val="0070C0"/>
+                </a:solidFill>
+                <a:latin typeface="Segoe UI" pitchFamily="34" charset="0"/>
+                <a:ea typeface="Segoe UI" pitchFamily="34" charset="0"/>
+                <a:cs typeface="Segoe UI" pitchFamily="34" charset="0"/>
+              </a:rPr>
+              <a:t>Esqueci minha senha</a:t>
+            </a:r>
+          </a:p>
+        </p:txBody>
+      </p:sp>
+      <p:sp>
+        <p:nvSpPr>
+          <p:cNvPr id="40" name="Content"/>
+          <p:cNvSpPr txBox="1"/>
+          <p:nvPr>
+            <p:custDataLst>
+              <p:custData r:id="rId8"/>
+            </p:custDataLst>
+          </p:nvPr>
+        </p:nvSpPr>
+        <p:spPr>
+          <a:xfrm>
+            <a:off x="4935778" y="3040291"/>
+            <a:ext cx="1958678" cy="353943"/>
+          </a:xfrm>
+          <a:prstGeom prst="rect">
+            <a:avLst/>
+          </a:prstGeom>
+          <a:noFill/>
+        </p:spPr>
+        <p:txBody>
+          <a:bodyPr wrap="none" lIns="91440" tIns="18288" rIns="91440" bIns="27432" rtlCol="0" anchor="ctr" anchorCtr="0">
+            <a:spAutoFit/>
+          </a:bodyPr>
+          <a:lstStyle/>
+          <a:p>
+            <a:r>
+              <a:rPr lang="en-US" sz="2000" dirty="0">
+                <a:solidFill>
+                  <a:srgbClr val="000000"/>
+                </a:solidFill>
+                <a:latin typeface="Segoe UI" pitchFamily="34" charset="0"/>
+                <a:ea typeface="Segoe UI" pitchFamily="34" charset="0"/>
+                <a:cs typeface="Segoe UI" pitchFamily="34" charset="0"/>
+              </a:rPr>
+              <a:t>Portal do </a:t>
+            </a:r>
+            <a:r>
+              <a:rPr lang="pt-BR" sz="2000" dirty="0">
+                <a:solidFill>
+                  <a:srgbClr val="000000"/>
+                </a:solidFill>
+                <a:latin typeface="Segoe UI" pitchFamily="34" charset="0"/>
+                <a:ea typeface="Segoe UI" pitchFamily="34" charset="0"/>
+                <a:cs typeface="Segoe UI" pitchFamily="34" charset="0"/>
+              </a:rPr>
+              <a:t>Aluno</a:t>
+            </a:r>
+          </a:p>
+        </p:txBody>
+      </p:sp>
+      <p:pic>
+        <p:nvPicPr>
+          <p:cNvPr id="41" name="Imagem 40"/>
+          <p:cNvPicPr>
+            <a:picLocks noChangeAspect="1"/>
+          </p:cNvPicPr>
+          <p:nvPr/>
+        </p:nvPicPr>
+        <p:blipFill>
+          <a:blip r:embed="rId17"/>
+          <a:stretch>
+            <a:fillRect/>
+          </a:stretch>
+        </p:blipFill>
+        <p:spPr>
+          <a:xfrm>
+            <a:off x="3850172" y="2180115"/>
+            <a:ext cx="279868" cy="582634"/>
+          </a:xfrm>
+          <a:prstGeom prst="rect">
+            <a:avLst/>
+          </a:prstGeom>
+        </p:spPr>
+      </p:pic>
+      <p:sp>
+        <p:nvSpPr>
+          <p:cNvPr id="42" name="Content"/>
+          <p:cNvSpPr txBox="1"/>
+          <p:nvPr>
+            <p:custDataLst>
+              <p:custData r:id="rId9"/>
+            </p:custDataLst>
+          </p:nvPr>
+        </p:nvSpPr>
+        <p:spPr>
+          <a:xfrm>
+            <a:off x="4084115" y="2237174"/>
+            <a:ext cx="1741952" cy="538609"/>
+          </a:xfrm>
+          <a:prstGeom prst="rect">
+            <a:avLst/>
+          </a:prstGeom>
+          <a:noFill/>
+        </p:spPr>
+        <p:txBody>
+          <a:bodyPr wrap="none" lIns="91440" tIns="18288" rIns="91440" bIns="27432" rtlCol="0" anchor="ctr" anchorCtr="0">
+            <a:spAutoFit/>
+          </a:bodyPr>
+          <a:lstStyle/>
+          <a:p>
+            <a:r>
+              <a:rPr lang="pt-BR" sz="3200" dirty="0">
+                <a:solidFill>
+                  <a:srgbClr val="000000"/>
+                </a:solidFill>
+                <a:latin typeface="Segoe UI" pitchFamily="34" charset="0"/>
+                <a:ea typeface="Segoe UI" pitchFamily="34" charset="0"/>
+                <a:cs typeface="Segoe UI" pitchFamily="34" charset="0"/>
+              </a:rPr>
+              <a:t>UNIRON</a:t>
+            </a:r>
           </a:p>
         </p:txBody>
       </p:sp>
@@ -3291,4 +4806,256 @@
     </a:ext>
   </a:extLst>
 </a:theme>
+</file>
+
+<file path=customXml/item1.xml><?xml version="1.0" encoding="utf-8"?>
+<Control xmlns="http://schemas.microsoft.com/VisualStudio/2011/storyboarding/control">
+  <Id Name="System.Storyboarding.Backgrounds.WebBrowser" Revision="1" Stencil="System.Storyboarding.Backgrounds" StencilVersion="0.1"/>
+</Control>
+</file>
+
+<file path=customXml/item10.xml><?xml version="1.0" encoding="utf-8"?>
+<Control xmlns="http://schemas.microsoft.com/VisualStudio/2011/storyboarding/control">
+  <Id Name="System.Storyboarding.Backgrounds.WebBrowser" Revision="1" Stencil="System.Storyboarding.Backgrounds" StencilVersion="0.1"/>
+</Control>
+</file>
+
+<file path=customXml/item11.xml><?xml version="1.0" encoding="utf-8"?>
+<Control xmlns="http://schemas.microsoft.com/VisualStudio/2011/storyboarding/control">
+  <Id Name="System.Storyboarding.Backgrounds.WebBrowser" Revision="1" Stencil="System.Storyboarding.Backgrounds" StencilVersion="0.1"/>
+</Control>
+</file>
+
+<file path=customXml/item12.xml><?xml version="1.0" encoding="utf-8"?>
+<Control xmlns="http://schemas.microsoft.com/VisualStudio/2011/storyboarding/control">
+  <Id Name="System.Storyboarding.Backgrounds.WebBrowser" Revision="1" Stencil="System.Storyboarding.Backgrounds" StencilVersion="0.1"/>
+</Control>
+</file>
+
+<file path=customXml/item13.xml><?xml version="1.0" encoding="utf-8"?>
+<Control xmlns="http://schemas.microsoft.com/VisualStudio/2011/storyboarding/control">
+  <Id Name="System.Storyboarding.Backgrounds.WebBrowser" Revision="1" Stencil="System.Storyboarding.Backgrounds" StencilVersion="0.1"/>
+</Control>
+</file>
+
+<file path=customXml/item14.xml><?xml version="1.0" encoding="utf-8"?>
+<Control xmlns="http://schemas.microsoft.com/VisualStudio/2011/storyboarding/control">
+  <Id Name="System.Storyboarding.Backgrounds.WebBrowser" Revision="1" Stencil="System.Storyboarding.Backgrounds" StencilVersion="0.1"/>
+</Control>
+</file>
+
+<file path=customXml/item15.xml><?xml version="1.0" encoding="utf-8"?>
+<Control xmlns="http://schemas.microsoft.com/VisualStudio/2011/storyboarding/control">
+  <Id Name="System.Storyboarding.Backgrounds.WebBrowser" Revision="1" Stencil="System.Storyboarding.Backgrounds" StencilVersion="0.1"/>
+</Control>
+</file>
+
+<file path=customXml/item16.xml><?xml version="1.0" encoding="utf-8"?>
+<Control xmlns="http://schemas.microsoft.com/VisualStudio/2011/storyboarding/control">
+  <Id Name="System.Storyboarding.Backgrounds.WebBrowser" Revision="1" Stencil="System.Storyboarding.Backgrounds" StencilVersion="0.1"/>
+</Control>
+</file>
+
+<file path=customXml/item17.xml><?xml version="1.0" encoding="utf-8"?>
+<Control xmlns="http://schemas.microsoft.com/VisualStudio/2011/storyboarding/control">
+  <Id Name="System.Storyboarding.Backgrounds.WebBrowser" Revision="1" Stencil="System.Storyboarding.Backgrounds" StencilVersion="0.1"/>
+</Control>
+</file>
+
+<file path=customXml/item18.xml><?xml version="1.0" encoding="utf-8"?>
+<Control xmlns="http://schemas.microsoft.com/VisualStudio/2011/storyboarding/control">
+  <Id Name="System.Storyboarding.Backgrounds.WebBrowser" Revision="1" Stencil="System.Storyboarding.Backgrounds" StencilVersion="0.1"/>
+</Control>
+</file>
+
+<file path=customXml/item2.xml><?xml version="1.0" encoding="utf-8"?>
+<Control xmlns="http://schemas.microsoft.com/VisualStudio/2011/storyboarding/control">
+  <Id Name="System.Storyboarding.Common.TextInput" Revision="1" Stencil="System.Storyboarding.Common" StencilVersion="0.1"/>
+</Control>
+</file>
+
+<file path=customXml/item3.xml><?xml version="1.0" encoding="utf-8"?>
+<Control xmlns="http://schemas.microsoft.com/VisualStudio/2011/storyboarding/control">
+  <Id Name="System.Storyboarding.Common.TextInput" Revision="1" Stencil="System.Storyboarding.Common" StencilVersion="0.1"/>
+</Control>
+</file>
+
+<file path=customXml/item4.xml><?xml version="1.0" encoding="utf-8"?>
+<Control xmlns="http://schemas.microsoft.com/VisualStudio/2011/storyboarding/control">
+  <Id Name="System.Storyboarding.Common.Button" Revision="1" Stencil="System.Storyboarding.Common" StencilVersion="0.1"/>
+</Control>
+</file>
+
+<file path=customXml/item5.xml><?xml version="1.0" encoding="utf-8"?>
+<Control xmlns="http://schemas.microsoft.com/VisualStudio/2011/storyboarding/control">
+  <Id Name="System.Storyboarding.Common.Text" Revision="1" Stencil="System.Storyboarding.Common" StencilVersion="0.1"/>
+</Control>
+</file>
+
+<file path=customXml/item6.xml><?xml version="1.0" encoding="utf-8"?>
+<Control xmlns="http://schemas.microsoft.com/VisualStudio/2011/storyboarding/control">
+  <Id Name="System.Storyboarding.Common.Text" Revision="1" Stencil="System.Storyboarding.Common" StencilVersion="0.1"/>
+</Control>
+</file>
+
+<file path=customXml/item7.xml><?xml version="1.0" encoding="utf-8"?>
+<Control xmlns="http://schemas.microsoft.com/VisualStudio/2011/storyboarding/control">
+  <Id Name="System.Storyboarding.Common.Text" Revision="1" Stencil="System.Storyboarding.Common" StencilVersion="0.1"/>
+</Control>
+</file>
+
+<file path=customXml/item8.xml><?xml version="1.0" encoding="utf-8"?>
+<Control xmlns="http://schemas.microsoft.com/VisualStudio/2011/storyboarding/control">
+  <Id Name="System.Storyboarding.Common.Text" Revision="1" Stencil="System.Storyboarding.Common" StencilVersion="0.1"/>
+</Control>
+</file>
+
+<file path=customXml/item9.xml><?xml version="1.0" encoding="utf-8"?>
+<Control xmlns="http://schemas.microsoft.com/VisualStudio/2011/storyboarding/control">
+  <Id Name="System.Storyboarding.Common.Text" Revision="1" Stencil="System.Storyboarding.Common" StencilVersion="0.1"/>
+</Control>
+</file>
+
+<file path=customXml/itemProps1.xml><?xml version="1.0" encoding="utf-8"?>
+<ds:datastoreItem xmlns:ds="http://schemas.openxmlformats.org/officeDocument/2006/customXml" ds:itemID="{487173A5-A9D2-4BCA-990A-1965DC6A52B3}">
+  <ds:schemaRefs>
+    <ds:schemaRef ds:uri="http://schemas.microsoft.com/VisualStudio/2011/storyboarding/control"/>
+  </ds:schemaRefs>
+</ds:datastoreItem>
+</file>
+
+<file path=customXml/itemProps10.xml><?xml version="1.0" encoding="utf-8"?>
+<ds:datastoreItem xmlns:ds="http://schemas.openxmlformats.org/officeDocument/2006/customXml" ds:itemID="{136156A8-E1CA-4F3D-82AA-BE652C9F64F2}">
+  <ds:schemaRefs>
+    <ds:schemaRef ds:uri="http://schemas.microsoft.com/VisualStudio/2011/storyboarding/control"/>
+  </ds:schemaRefs>
+</ds:datastoreItem>
+</file>
+
+<file path=customXml/itemProps11.xml><?xml version="1.0" encoding="utf-8"?>
+<ds:datastoreItem xmlns:ds="http://schemas.openxmlformats.org/officeDocument/2006/customXml" ds:itemID="{2AC127BD-FC4D-4BF5-A50B-50CEE625CC83}">
+  <ds:schemaRefs>
+    <ds:schemaRef ds:uri="http://schemas.microsoft.com/VisualStudio/2011/storyboarding/control"/>
+  </ds:schemaRefs>
+</ds:datastoreItem>
+</file>
+
+<file path=customXml/itemProps12.xml><?xml version="1.0" encoding="utf-8"?>
+<ds:datastoreItem xmlns:ds="http://schemas.openxmlformats.org/officeDocument/2006/customXml" ds:itemID="{3268A3EF-D6CA-49B5-A04C-91B4AA53FFB2}">
+  <ds:schemaRefs>
+    <ds:schemaRef ds:uri="http://schemas.microsoft.com/VisualStudio/2011/storyboarding/control"/>
+  </ds:schemaRefs>
+</ds:datastoreItem>
+</file>
+
+<file path=customXml/itemProps13.xml><?xml version="1.0" encoding="utf-8"?>
+<ds:datastoreItem xmlns:ds="http://schemas.openxmlformats.org/officeDocument/2006/customXml" ds:itemID="{D9833B6F-3137-4DD4-9271-F02E3222DF3E}">
+  <ds:schemaRefs>
+    <ds:schemaRef ds:uri="http://schemas.microsoft.com/VisualStudio/2011/storyboarding/control"/>
+  </ds:schemaRefs>
+</ds:datastoreItem>
+</file>
+
+<file path=customXml/itemProps14.xml><?xml version="1.0" encoding="utf-8"?>
+<ds:datastoreItem xmlns:ds="http://schemas.openxmlformats.org/officeDocument/2006/customXml" ds:itemID="{83197DEB-3330-47B2-AAEF-913A4A605B50}">
+  <ds:schemaRefs>
+    <ds:schemaRef ds:uri="http://schemas.microsoft.com/VisualStudio/2011/storyboarding/control"/>
+  </ds:schemaRefs>
+</ds:datastoreItem>
+</file>
+
+<file path=customXml/itemProps15.xml><?xml version="1.0" encoding="utf-8"?>
+<ds:datastoreItem xmlns:ds="http://schemas.openxmlformats.org/officeDocument/2006/customXml" ds:itemID="{BA892619-0C76-46BF-A1E5-E409DF05C4C5}">
+  <ds:schemaRefs>
+    <ds:schemaRef ds:uri="http://schemas.microsoft.com/VisualStudio/2011/storyboarding/control"/>
+  </ds:schemaRefs>
+</ds:datastoreItem>
+</file>
+
+<file path=customXml/itemProps16.xml><?xml version="1.0" encoding="utf-8"?>
+<ds:datastoreItem xmlns:ds="http://schemas.openxmlformats.org/officeDocument/2006/customXml" ds:itemID="{4791953E-C724-42FE-B90C-06F5F247AC0B}">
+  <ds:schemaRefs>
+    <ds:schemaRef ds:uri="http://schemas.microsoft.com/VisualStudio/2011/storyboarding/control"/>
+  </ds:schemaRefs>
+</ds:datastoreItem>
+</file>
+
+<file path=customXml/itemProps17.xml><?xml version="1.0" encoding="utf-8"?>
+<ds:datastoreItem xmlns:ds="http://schemas.openxmlformats.org/officeDocument/2006/customXml" ds:itemID="{6054DAC1-D987-43B9-93D9-57F739300240}">
+  <ds:schemaRefs>
+    <ds:schemaRef ds:uri="http://schemas.microsoft.com/VisualStudio/2011/storyboarding/control"/>
+  </ds:schemaRefs>
+</ds:datastoreItem>
+</file>
+
+<file path=customXml/itemProps18.xml><?xml version="1.0" encoding="utf-8"?>
+<ds:datastoreItem xmlns:ds="http://schemas.openxmlformats.org/officeDocument/2006/customXml" ds:itemID="{33F1231F-0306-4431-B9A3-C4103AB3FAD4}">
+  <ds:schemaRefs>
+    <ds:schemaRef ds:uri="http://schemas.microsoft.com/VisualStudio/2011/storyboarding/control"/>
+  </ds:schemaRefs>
+</ds:datastoreItem>
+</file>
+
+<file path=customXml/itemProps2.xml><?xml version="1.0" encoding="utf-8"?>
+<ds:datastoreItem xmlns:ds="http://schemas.openxmlformats.org/officeDocument/2006/customXml" ds:itemID="{21B35B14-483B-4E76-AAEC-4BB3303C976B}">
+  <ds:schemaRefs>
+    <ds:schemaRef ds:uri="http://schemas.microsoft.com/VisualStudio/2011/storyboarding/control"/>
+  </ds:schemaRefs>
+</ds:datastoreItem>
+</file>
+
+<file path=customXml/itemProps3.xml><?xml version="1.0" encoding="utf-8"?>
+<ds:datastoreItem xmlns:ds="http://schemas.openxmlformats.org/officeDocument/2006/customXml" ds:itemID="{986B96FE-18A9-49B5-A777-8363FE00896C}">
+  <ds:schemaRefs>
+    <ds:schemaRef ds:uri="http://schemas.microsoft.com/VisualStudio/2011/storyboarding/control"/>
+  </ds:schemaRefs>
+</ds:datastoreItem>
+</file>
+
+<file path=customXml/itemProps4.xml><?xml version="1.0" encoding="utf-8"?>
+<ds:datastoreItem xmlns:ds="http://schemas.openxmlformats.org/officeDocument/2006/customXml" ds:itemID="{E728FC32-ED93-427B-B9DE-6916B1306E12}">
+  <ds:schemaRefs>
+    <ds:schemaRef ds:uri="http://schemas.microsoft.com/VisualStudio/2011/storyboarding/control"/>
+  </ds:schemaRefs>
+</ds:datastoreItem>
+</file>
+
+<file path=customXml/itemProps5.xml><?xml version="1.0" encoding="utf-8"?>
+<ds:datastoreItem xmlns:ds="http://schemas.openxmlformats.org/officeDocument/2006/customXml" ds:itemID="{99CE0A09-15EE-4467-B74F-F200B8785290}">
+  <ds:schemaRefs>
+    <ds:schemaRef ds:uri="http://schemas.microsoft.com/VisualStudio/2011/storyboarding/control"/>
+  </ds:schemaRefs>
+</ds:datastoreItem>
+</file>
+
+<file path=customXml/itemProps6.xml><?xml version="1.0" encoding="utf-8"?>
+<ds:datastoreItem xmlns:ds="http://schemas.openxmlformats.org/officeDocument/2006/customXml" ds:itemID="{8517BDEE-C78A-467C-908C-749FEE10693B}">
+  <ds:schemaRefs>
+    <ds:schemaRef ds:uri="http://schemas.microsoft.com/VisualStudio/2011/storyboarding/control"/>
+  </ds:schemaRefs>
+</ds:datastoreItem>
+</file>
+
+<file path=customXml/itemProps7.xml><?xml version="1.0" encoding="utf-8"?>
+<ds:datastoreItem xmlns:ds="http://schemas.openxmlformats.org/officeDocument/2006/customXml" ds:itemID="{5B7DBCCA-82D6-4705-8E56-C44CD2412A33}">
+  <ds:schemaRefs>
+    <ds:schemaRef ds:uri="http://schemas.microsoft.com/VisualStudio/2011/storyboarding/control"/>
+  </ds:schemaRefs>
+</ds:datastoreItem>
+</file>
+
+<file path=customXml/itemProps8.xml><?xml version="1.0" encoding="utf-8"?>
+<ds:datastoreItem xmlns:ds="http://schemas.openxmlformats.org/officeDocument/2006/customXml" ds:itemID="{67CF3844-0CC4-4FA0-ACDF-BF763B8E0F78}">
+  <ds:schemaRefs>
+    <ds:schemaRef ds:uri="http://schemas.microsoft.com/VisualStudio/2011/storyboarding/control"/>
+  </ds:schemaRefs>
+</ds:datastoreItem>
+</file>
+
+<file path=customXml/itemProps9.xml><?xml version="1.0" encoding="utf-8"?>
+<ds:datastoreItem xmlns:ds="http://schemas.openxmlformats.org/officeDocument/2006/customXml" ds:itemID="{C2504A3A-27C7-4086-A1D3-270B0D361FAE}">
+  <ds:schemaRefs>
+    <ds:schemaRef ds:uri="http://schemas.microsoft.com/VisualStudio/2011/storyboarding/control"/>
+  </ds:schemaRefs>
+</ds:datastoreItem>
 </file>
</xml_diff>

<commit_message>
RF3 Ajustes no login Mobile
</commit_message>
<xml_diff>
--- a/StoryBoards/StoryBoard_RF3_AcessoAAcervo_BuscaRapida.pptx
+++ b/StoryBoards/StoryBoard_RF3_AcessoAAcervo_BuscaRapida.pptx
@@ -2,12 +2,12 @@
 <file path=ppt/presentation.xml><?xml version="1.0" encoding="utf-8"?>
 <p:presentation xmlns:a="http://schemas.openxmlformats.org/drawingml/2006/main" xmlns:r="http://schemas.openxmlformats.org/officeDocument/2006/relationships" xmlns:p="http://schemas.openxmlformats.org/presentationml/2006/main" saveSubsetFonts="1">
   <p:sldMasterIdLst>
-    <p:sldMasterId id="2147483648" r:id="rId42"/>
+    <p:sldMasterId id="2147483648" r:id="rId44"/>
   </p:sldMasterIdLst>
   <p:sldIdLst>
-    <p:sldId id="256" r:id="rId43"/>
-    <p:sldId id="257" r:id="rId44"/>
-    <p:sldId id="258" r:id="rId45"/>
+    <p:sldId id="256" r:id="rId45"/>
+    <p:sldId id="257" r:id="rId46"/>
+    <p:sldId id="258" r:id="rId47"/>
   </p:sldIdLst>
   <p:sldSz cx="12192000" cy="6858000"/>
   <p:notesSz cx="6858000" cy="9144000"/>
@@ -247,7 +247,7 @@
           <a:p>
             <a:fld id="{716BBFDE-2C07-41DE-BC66-7742B12803DA}" type="datetimeFigureOut">
               <a:rPr lang="pt-BR" smtClean="0"/>
-              <a:t>13/05/2017</a:t>
+              <a:t>14/05/2017</a:t>
             </a:fld>
             <a:endParaRPr lang="pt-BR"/>
           </a:p>
@@ -415,7 +415,7 @@
           <a:p>
             <a:fld id="{716BBFDE-2C07-41DE-BC66-7742B12803DA}" type="datetimeFigureOut">
               <a:rPr lang="pt-BR" smtClean="0"/>
-              <a:t>13/05/2017</a:t>
+              <a:t>14/05/2017</a:t>
             </a:fld>
             <a:endParaRPr lang="pt-BR"/>
           </a:p>
@@ -593,7 +593,7 @@
           <a:p>
             <a:fld id="{716BBFDE-2C07-41DE-BC66-7742B12803DA}" type="datetimeFigureOut">
               <a:rPr lang="pt-BR" smtClean="0"/>
-              <a:t>13/05/2017</a:t>
+              <a:t>14/05/2017</a:t>
             </a:fld>
             <a:endParaRPr lang="pt-BR"/>
           </a:p>
@@ -761,7 +761,7 @@
           <a:p>
             <a:fld id="{716BBFDE-2C07-41DE-BC66-7742B12803DA}" type="datetimeFigureOut">
               <a:rPr lang="pt-BR" smtClean="0"/>
-              <a:t>13/05/2017</a:t>
+              <a:t>14/05/2017</a:t>
             </a:fld>
             <a:endParaRPr lang="pt-BR"/>
           </a:p>
@@ -1006,7 +1006,7 @@
           <a:p>
             <a:fld id="{716BBFDE-2C07-41DE-BC66-7742B12803DA}" type="datetimeFigureOut">
               <a:rPr lang="pt-BR" smtClean="0"/>
-              <a:t>13/05/2017</a:t>
+              <a:t>14/05/2017</a:t>
             </a:fld>
             <a:endParaRPr lang="pt-BR"/>
           </a:p>
@@ -1235,7 +1235,7 @@
           <a:p>
             <a:fld id="{716BBFDE-2C07-41DE-BC66-7742B12803DA}" type="datetimeFigureOut">
               <a:rPr lang="pt-BR" smtClean="0"/>
-              <a:t>13/05/2017</a:t>
+              <a:t>14/05/2017</a:t>
             </a:fld>
             <a:endParaRPr lang="pt-BR"/>
           </a:p>
@@ -1599,7 +1599,7 @@
           <a:p>
             <a:fld id="{716BBFDE-2C07-41DE-BC66-7742B12803DA}" type="datetimeFigureOut">
               <a:rPr lang="pt-BR" smtClean="0"/>
-              <a:t>13/05/2017</a:t>
+              <a:t>14/05/2017</a:t>
             </a:fld>
             <a:endParaRPr lang="pt-BR"/>
           </a:p>
@@ -1716,7 +1716,7 @@
           <a:p>
             <a:fld id="{716BBFDE-2C07-41DE-BC66-7742B12803DA}" type="datetimeFigureOut">
               <a:rPr lang="pt-BR" smtClean="0"/>
-              <a:t>13/05/2017</a:t>
+              <a:t>14/05/2017</a:t>
             </a:fld>
             <a:endParaRPr lang="pt-BR"/>
           </a:p>
@@ -1811,7 +1811,7 @@
           <a:p>
             <a:fld id="{716BBFDE-2C07-41DE-BC66-7742B12803DA}" type="datetimeFigureOut">
               <a:rPr lang="pt-BR" smtClean="0"/>
-              <a:t>13/05/2017</a:t>
+              <a:t>14/05/2017</a:t>
             </a:fld>
             <a:endParaRPr lang="pt-BR"/>
           </a:p>
@@ -2086,7 +2086,7 @@
           <a:p>
             <a:fld id="{716BBFDE-2C07-41DE-BC66-7742B12803DA}" type="datetimeFigureOut">
               <a:rPr lang="pt-BR" smtClean="0"/>
-              <a:t>13/05/2017</a:t>
+              <a:t>14/05/2017</a:t>
             </a:fld>
             <a:endParaRPr lang="pt-BR"/>
           </a:p>
@@ -2338,7 +2338,7 @@
           <a:p>
             <a:fld id="{716BBFDE-2C07-41DE-BC66-7742B12803DA}" type="datetimeFigureOut">
               <a:rPr lang="pt-BR" smtClean="0"/>
-              <a:t>13/05/2017</a:t>
+              <a:t>14/05/2017</a:t>
             </a:fld>
             <a:endParaRPr lang="pt-BR"/>
           </a:p>
@@ -2549,7 +2549,7 @@
           <a:p>
             <a:fld id="{716BBFDE-2C07-41DE-BC66-7742B12803DA}" type="datetimeFigureOut">
               <a:rPr lang="pt-BR" smtClean="0"/>
-              <a:t>13/05/2017</a:t>
+              <a:t>14/05/2017</a:t>
             </a:fld>
             <a:endParaRPr lang="pt-BR"/>
           </a:p>
@@ -7146,7 +7146,7 @@
             <p:nvPr/>
           </p:nvPicPr>
           <p:blipFill>
-            <a:blip r:embed="rId16">
+            <a:blip r:embed="rId18">
               <a:lum bright="70000" contrast="-70000"/>
               <a:extLst>
                 <a:ext uri="{28A0092B-C50C-407E-A947-70E740481C1C}">
@@ -7793,7 +7793,7 @@
             <p:nvPr/>
           </p:nvPicPr>
           <p:blipFill>
-            <a:blip r:embed="rId16">
+            <a:blip r:embed="rId18">
               <a:lum bright="70000" contrast="-70000"/>
               <a:extLst>
                 <a:ext uri="{28A0092B-C50C-407E-A947-70E740481C1C}">
@@ -8491,7 +8491,7 @@
               <p:nvPr/>
             </p:nvPicPr>
             <p:blipFill>
-              <a:blip r:embed="rId17" cstate="print">
+              <a:blip r:embed="rId19" cstate="print">
                 <a:extLst>
                   <a:ext uri="{28A0092B-C50C-407E-A947-70E740481C1C}">
                     <a14:useLocalDpi xmlns:a14="http://schemas.microsoft.com/office/drawing/2010/main" val="0"/>
@@ -8532,7 +8532,7 @@
               <p:nvPr/>
             </p:nvPicPr>
             <p:blipFill rotWithShape="1">
-              <a:blip r:embed="rId18" cstate="print">
+              <a:blip r:embed="rId20" cstate="print">
                 <a:extLst>
                   <a:ext uri="{28A0092B-C50C-407E-A947-70E740481C1C}">
                     <a14:useLocalDpi xmlns:a14="http://schemas.microsoft.com/office/drawing/2010/main" val="0"/>
@@ -8571,7 +8571,7 @@
               <p:nvPr/>
             </p:nvPicPr>
             <p:blipFill>
-              <a:blip r:embed="rId19" cstate="print">
+              <a:blip r:embed="rId21" cstate="print">
                 <a:extLst>
                   <a:ext uri="{28A0092B-C50C-407E-A947-70E740481C1C}">
                     <a14:useLocalDpi xmlns:a14="http://schemas.microsoft.com/office/drawing/2010/main" val="0"/>
@@ -8685,7 +8685,7 @@
                 <p:nvPr/>
               </p:nvPicPr>
               <p:blipFill>
-                <a:blip r:embed="rId20" cstate="print">
+                <a:blip r:embed="rId22" cstate="print">
                   <a:extLst>
                     <a:ext uri="{28A0092B-C50C-407E-A947-70E740481C1C}">
                       <a14:useLocalDpi xmlns:a14="http://schemas.microsoft.com/office/drawing/2010/main" val="0"/>
@@ -8726,7 +8726,7 @@
                 <p:nvPr/>
               </p:nvPicPr>
               <p:blipFill>
-                <a:blip r:embed="rId21" cstate="print">
+                <a:blip r:embed="rId23" cstate="print">
                   <a:extLst>
                     <a:ext uri="{28A0092B-C50C-407E-A947-70E740481C1C}">
                       <a14:useLocalDpi xmlns:a14="http://schemas.microsoft.com/office/drawing/2010/main" val="0"/>
@@ -8767,7 +8767,7 @@
                 <p:nvPr/>
               </p:nvPicPr>
               <p:blipFill>
-                <a:blip r:embed="rId22" cstate="print">
+                <a:blip r:embed="rId24" cstate="print">
                   <a:extLst>
                     <a:ext uri="{28A0092B-C50C-407E-A947-70E740481C1C}">
                       <a14:useLocalDpi xmlns:a14="http://schemas.microsoft.com/office/drawing/2010/main" val="0"/>
@@ -8957,7 +8957,7 @@
           <p:nvPr/>
         </p:nvPicPr>
         <p:blipFill>
-          <a:blip r:embed="rId23"/>
+          <a:blip r:embed="rId25"/>
           <a:stretch>
             <a:fillRect/>
           </a:stretch>
@@ -9676,7 +9676,7 @@
               <p:nvPr/>
             </p:nvPicPr>
             <p:blipFill>
-              <a:blip r:embed="rId17" cstate="print">
+              <a:blip r:embed="rId19" cstate="print">
                 <a:extLst>
                   <a:ext uri="{28A0092B-C50C-407E-A947-70E740481C1C}">
                     <a14:useLocalDpi xmlns:a14="http://schemas.microsoft.com/office/drawing/2010/main" val="0"/>
@@ -9717,7 +9717,7 @@
               <p:nvPr/>
             </p:nvPicPr>
             <p:blipFill rotWithShape="1">
-              <a:blip r:embed="rId18" cstate="print">
+              <a:blip r:embed="rId20" cstate="print">
                 <a:extLst>
                   <a:ext uri="{28A0092B-C50C-407E-A947-70E740481C1C}">
                     <a14:useLocalDpi xmlns:a14="http://schemas.microsoft.com/office/drawing/2010/main" val="0"/>
@@ -9756,7 +9756,7 @@
               <p:nvPr/>
             </p:nvPicPr>
             <p:blipFill>
-              <a:blip r:embed="rId19" cstate="print">
+              <a:blip r:embed="rId21" cstate="print">
                 <a:extLst>
                   <a:ext uri="{28A0092B-C50C-407E-A947-70E740481C1C}">
                     <a14:useLocalDpi xmlns:a14="http://schemas.microsoft.com/office/drawing/2010/main" val="0"/>
@@ -9870,7 +9870,7 @@
                 <p:nvPr/>
               </p:nvPicPr>
               <p:blipFill>
-                <a:blip r:embed="rId20" cstate="print">
+                <a:blip r:embed="rId22" cstate="print">
                   <a:extLst>
                     <a:ext uri="{28A0092B-C50C-407E-A947-70E740481C1C}">
                       <a14:useLocalDpi xmlns:a14="http://schemas.microsoft.com/office/drawing/2010/main" val="0"/>
@@ -9911,7 +9911,7 @@
                 <p:nvPr/>
               </p:nvPicPr>
               <p:blipFill>
-                <a:blip r:embed="rId21" cstate="print">
+                <a:blip r:embed="rId23" cstate="print">
                   <a:extLst>
                     <a:ext uri="{28A0092B-C50C-407E-A947-70E740481C1C}">
                       <a14:useLocalDpi xmlns:a14="http://schemas.microsoft.com/office/drawing/2010/main" val="0"/>
@@ -9952,7 +9952,7 @@
                 <p:nvPr/>
               </p:nvPicPr>
               <p:blipFill>
-                <a:blip r:embed="rId22" cstate="print">
+                <a:blip r:embed="rId24" cstate="print">
                   <a:extLst>
                     <a:ext uri="{28A0092B-C50C-407E-A947-70E740481C1C}">
                       <a14:useLocalDpi xmlns:a14="http://schemas.microsoft.com/office/drawing/2010/main" val="0"/>
@@ -10084,8 +10084,8 @@
         </p:nvSpPr>
         <p:spPr>
           <a:xfrm>
-            <a:off x="1083144" y="1517919"/>
-            <a:ext cx="2837845" cy="3572342"/>
+            <a:off x="1134215" y="1799731"/>
+            <a:ext cx="2695217" cy="2906717"/>
           </a:xfrm>
           <a:prstGeom prst="roundRect">
             <a:avLst/>
@@ -10335,7 +10335,7 @@
         </p:nvSpPr>
         <p:spPr>
           <a:xfrm>
-            <a:off x="7322250" y="3943683"/>
+            <a:off x="7309100" y="3841215"/>
             <a:ext cx="1400901" cy="308277"/>
           </a:xfrm>
           <a:prstGeom prst="rect">
@@ -10402,14 +10402,14 @@
           <p:nvPr/>
         </p:nvPicPr>
         <p:blipFill>
-          <a:blip r:embed="rId23"/>
+          <a:blip r:embed="rId25"/>
           <a:stretch>
             <a:fillRect/>
           </a:stretch>
         </p:blipFill>
         <p:spPr>
           <a:xfrm>
-            <a:off x="1329810" y="1707600"/>
+            <a:off x="1304790" y="1989412"/>
             <a:ext cx="279868" cy="582634"/>
           </a:xfrm>
           <a:prstGeom prst="rect">
@@ -10429,7 +10429,7 @@
         </p:nvSpPr>
         <p:spPr>
           <a:xfrm>
-            <a:off x="1550895" y="1865862"/>
+            <a:off x="1525875" y="2147674"/>
             <a:ext cx="1060868" cy="323165"/>
           </a:xfrm>
           <a:prstGeom prst="rect">
@@ -10469,7 +10469,7 @@
         </p:nvSpPr>
         <p:spPr>
           <a:xfrm>
-            <a:off x="1830763" y="2230852"/>
+            <a:off x="1798583" y="2576522"/>
             <a:ext cx="1425518" cy="261610"/>
           </a:xfrm>
           <a:prstGeom prst="rect">
@@ -10520,7 +10520,7 @@
         </p:nvSpPr>
         <p:spPr>
           <a:xfrm>
-            <a:off x="1882236" y="3853314"/>
+            <a:off x="1857216" y="4135126"/>
             <a:ext cx="1106592" cy="228600"/>
           </a:xfrm>
           <a:prstGeom prst="roundRect">
@@ -10589,7 +10589,7 @@
         </p:nvSpPr>
         <p:spPr>
           <a:xfrm>
-            <a:off x="1800022" y="2743424"/>
+            <a:off x="1775002" y="3025236"/>
             <a:ext cx="1400901" cy="317072"/>
           </a:xfrm>
           <a:prstGeom prst="rect">
@@ -10659,7 +10659,7 @@
         </p:nvSpPr>
         <p:spPr>
           <a:xfrm>
-            <a:off x="1813172" y="3303263"/>
+            <a:off x="1775002" y="3483180"/>
             <a:ext cx="1400901" cy="308277"/>
           </a:xfrm>
           <a:prstGeom prst="rect">
@@ -10714,6 +10714,86 @@
               <a:latin typeface="Segoe UI" pitchFamily="34" charset="0"/>
               <a:cs typeface="Segoe UI" pitchFamily="34" charset="0"/>
             </a:endParaRPr>
+          </a:p>
+        </p:txBody>
+      </p:sp>
+      <p:sp>
+        <p:nvSpPr>
+          <p:cNvPr id="105" name="Content"/>
+          <p:cNvSpPr txBox="1"/>
+          <p:nvPr>
+            <p:custDataLst>
+              <p:custData r:id="rId15"/>
+            </p:custDataLst>
+          </p:nvPr>
+        </p:nvSpPr>
+        <p:spPr>
+          <a:xfrm>
+            <a:off x="7226903" y="4154748"/>
+            <a:ext cx="1483098" cy="215444"/>
+          </a:xfrm>
+          <a:prstGeom prst="rect">
+            <a:avLst/>
+          </a:prstGeom>
+          <a:noFill/>
+        </p:spPr>
+        <p:txBody>
+          <a:bodyPr wrap="none" lIns="91440" tIns="18288" rIns="91440" bIns="27432" rtlCol="0" anchor="ctr" anchorCtr="0">
+            <a:spAutoFit/>
+          </a:bodyPr>
+          <a:lstStyle/>
+          <a:p>
+            <a:r>
+              <a:rPr lang="pt-BR" sz="1100" dirty="0">
+                <a:solidFill>
+                  <a:srgbClr val="0070C0"/>
+                </a:solidFill>
+                <a:latin typeface="Segoe UI" pitchFamily="34" charset="0"/>
+                <a:ea typeface="Segoe UI" pitchFamily="34" charset="0"/>
+                <a:cs typeface="Segoe UI" pitchFamily="34" charset="0"/>
+              </a:rPr>
+              <a:t>Esqueci minha senha</a:t>
+            </a:r>
+          </a:p>
+        </p:txBody>
+      </p:sp>
+      <p:sp>
+        <p:nvSpPr>
+          <p:cNvPr id="106" name="Content"/>
+          <p:cNvSpPr txBox="1"/>
+          <p:nvPr>
+            <p:custDataLst>
+              <p:custData r:id="rId16"/>
+            </p:custDataLst>
+          </p:nvPr>
+        </p:nvSpPr>
+        <p:spPr>
+          <a:xfrm>
+            <a:off x="1710789" y="3776864"/>
+            <a:ext cx="1483098" cy="215444"/>
+          </a:xfrm>
+          <a:prstGeom prst="rect">
+            <a:avLst/>
+          </a:prstGeom>
+          <a:noFill/>
+        </p:spPr>
+        <p:txBody>
+          <a:bodyPr wrap="none" lIns="91440" tIns="18288" rIns="91440" bIns="27432" rtlCol="0" anchor="ctr" anchorCtr="0">
+            <a:spAutoFit/>
+          </a:bodyPr>
+          <a:lstStyle/>
+          <a:p>
+            <a:r>
+              <a:rPr lang="pt-BR" sz="1100" dirty="0">
+                <a:solidFill>
+                  <a:srgbClr val="0070C0"/>
+                </a:solidFill>
+                <a:latin typeface="Segoe UI" pitchFamily="34" charset="0"/>
+                <a:ea typeface="Segoe UI" pitchFamily="34" charset="0"/>
+                <a:cs typeface="Segoe UI" pitchFamily="34" charset="0"/>
+              </a:rPr>
+              <a:t>Esqueci minha senha</a:t>
+            </a:r>
           </a:p>
         </p:txBody>
       </p:sp>
@@ -11027,13 +11107,13 @@
 
 <file path=customXml/item1.xml><?xml version="1.0" encoding="utf-8"?>
 <Control xmlns="http://schemas.microsoft.com/VisualStudio/2011/storyboarding/control">
-  <Id Name="System.Storyboarding.Backgrounds.WebBrowser" Revision="1" Stencil="System.Storyboarding.Backgrounds" StencilVersion="0.1"/>
+  <Id Name="System.Storyboarding.Common.Text" Revision="1" Stencil="System.Storyboarding.Common" StencilVersion="0.1"/>
 </Control>
 </file>
 
 <file path=customXml/item10.xml><?xml version="1.0" encoding="utf-8"?>
 <Control xmlns="http://schemas.microsoft.com/VisualStudio/2011/storyboarding/control">
-  <Id Name="System.Storyboarding.Common.TextInput" Revision="1" Stencil="System.Storyboarding.Common" StencilVersion="0.1"/>
+  <Id Name="System.Storyboarding.Backgrounds.WebBrowser" Revision="1" Stencil="System.Storyboarding.Backgrounds" StencilVersion="0.1"/>
 </Control>
 </file>
 
@@ -11057,7 +11137,7 @@
 
 <file path=customXml/item14.xml><?xml version="1.0" encoding="utf-8"?>
 <Control xmlns="http://schemas.microsoft.com/VisualStudio/2011/storyboarding/control">
-  <Id Name="System.Storyboarding.Common.TextInput" Revision="1" Stencil="System.Storyboarding.Common" StencilVersion="0.1"/>
+  <Id Name="System.Storyboarding.Common.Text" Revision="1" Stencil="System.Storyboarding.Common" StencilVersion="0.1"/>
 </Control>
 </file>
 
@@ -11069,31 +11149,31 @@
 
 <file path=customXml/item16.xml><?xml version="1.0" encoding="utf-8"?>
 <Control xmlns="http://schemas.microsoft.com/VisualStudio/2011/storyboarding/control">
-  <Id Name="System.Storyboarding.Common.TextInput" Revision="1" Stencil="System.Storyboarding.Common" StencilVersion="0.1"/>
+  <Id Name="System.Storyboarding.Backgrounds.WebBrowser" Revision="1" Stencil="System.Storyboarding.Backgrounds" StencilVersion="0.1"/>
 </Control>
 </file>
 
 <file path=customXml/item17.xml><?xml version="1.0" encoding="utf-8"?>
 <Control xmlns="http://schemas.microsoft.com/VisualStudio/2011/storyboarding/control">
-  <Id Name="System.Storyboarding.Backgrounds.WebBrowser" Revision="1" Stencil="System.Storyboarding.Backgrounds" StencilVersion="0.1"/>
+  <Id Name="System.Storyboarding.Common.Text" Revision="1" Stencil="System.Storyboarding.Common" StencilVersion="0.1"/>
 </Control>
 </file>
 
 <file path=customXml/item18.xml><?xml version="1.0" encoding="utf-8"?>
 <Control xmlns="http://schemas.microsoft.com/VisualStudio/2011/storyboarding/control">
-  <Id Name="System.Storyboarding.Common.TextInput" Revision="1" Stencil="System.Storyboarding.Common" StencilVersion="0.1"/>
+  <Id Name="System.Storyboarding.Common.Text" Revision="1" Stencil="System.Storyboarding.Common" StencilVersion="0.1"/>
 </Control>
 </file>
 
 <file path=customXml/item19.xml><?xml version="1.0" encoding="utf-8"?>
 <Control xmlns="http://schemas.microsoft.com/VisualStudio/2011/storyboarding/control">
-  <Id Name="System.Storyboarding.Common.Text" Revision="1" Stencil="System.Storyboarding.Common" StencilVersion="0.1"/>
+  <Id Name="System.Storyboarding.Common.TextInput" Revision="1" Stencil="System.Storyboarding.Common" StencilVersion="0.1"/>
 </Control>
 </file>
 
 <file path=customXml/item2.xml><?xml version="1.0" encoding="utf-8"?>
 <Control xmlns="http://schemas.microsoft.com/VisualStudio/2011/storyboarding/control">
-  <Id Name="System.Storyboarding.Common.Text" Revision="1" Stencil="System.Storyboarding.Common" StencilVersion="0.1"/>
+  <Id Name="System.Storyboarding.Backgrounds.WebBrowser" Revision="1" Stencil="System.Storyboarding.Backgrounds" StencilVersion="0.1"/>
 </Control>
 </file>
 
@@ -11111,19 +11191,19 @@
 
 <file path=customXml/item22.xml><?xml version="1.0" encoding="utf-8"?>
 <Control xmlns="http://schemas.microsoft.com/VisualStudio/2011/storyboarding/control">
-  <Id Name="System.Storyboarding.Common.Text" Revision="1" Stencil="System.Storyboarding.Common" StencilVersion="0.1"/>
+  <Id Name="System.Storyboarding.Backgrounds.WebBrowser" Revision="1" Stencil="System.Storyboarding.Backgrounds" StencilVersion="0.1"/>
 </Control>
 </file>
 
 <file path=customXml/item23.xml><?xml version="1.0" encoding="utf-8"?>
 <Control xmlns="http://schemas.microsoft.com/VisualStudio/2011/storyboarding/control">
-  <Id Name="System.Storyboarding.Common.Button" Revision="1" Stencil="System.Storyboarding.Common" StencilVersion="0.1"/>
+  <Id Name="System.Storyboarding.Common.Text" Revision="1" Stencil="System.Storyboarding.Common" StencilVersion="0.1"/>
 </Control>
 </file>
 
 <file path=customXml/item24.xml><?xml version="1.0" encoding="utf-8"?>
 <Control xmlns="http://schemas.microsoft.com/VisualStudio/2011/storyboarding/control">
-  <Id Name="System.Storyboarding.Backgrounds.WebBrowser" Revision="1" Stencil="System.Storyboarding.Backgrounds" StencilVersion="0.1"/>
+  <Id Name="System.Storyboarding.Common.TextInput" Revision="1" Stencil="System.Storyboarding.Common" StencilVersion="0.1"/>
 </Control>
 </file>
 
@@ -11135,7 +11215,7 @@
 
 <file path=customXml/item26.xml><?xml version="1.0" encoding="utf-8"?>
 <Control xmlns="http://schemas.microsoft.com/VisualStudio/2011/storyboarding/control">
-  <Id Name="System.Storyboarding.Common.TextInput" Revision="1" Stencil="System.Storyboarding.Common" StencilVersion="0.1"/>
+  <Id Name="System.Storyboarding.Common.Button" Revision="1" Stencil="System.Storyboarding.Common" StencilVersion="0.1"/>
 </Control>
 </file>
 
@@ -11147,13 +11227,13 @@
 
 <file path=customXml/item28.xml><?xml version="1.0" encoding="utf-8"?>
 <Control xmlns="http://schemas.microsoft.com/VisualStudio/2011/storyboarding/control">
-  <Id Name="System.Storyboarding.Backgrounds.WebBrowser" Revision="1" Stencil="System.Storyboarding.Backgrounds" StencilVersion="0.1"/>
+  <Id Name="System.Storyboarding.Common.Text" Revision="1" Stencil="System.Storyboarding.Common" StencilVersion="0.1"/>
 </Control>
 </file>
 
 <file path=customXml/item29.xml><?xml version="1.0" encoding="utf-8"?>
 <Control xmlns="http://schemas.microsoft.com/VisualStudio/2011/storyboarding/control">
-  <Id Name="System.Storyboarding.Backgrounds.WebBrowser" Revision="1" Stencil="System.Storyboarding.Backgrounds" StencilVersion="0.1"/>
+  <Id Name="System.Storyboarding.Common.TextInput" Revision="1" Stencil="System.Storyboarding.Common" StencilVersion="0.1"/>
 </Control>
 </file>
 
@@ -11165,13 +11245,13 @@
 
 <file path=customXml/item30.xml><?xml version="1.0" encoding="utf-8"?>
 <Control xmlns="http://schemas.microsoft.com/VisualStudio/2011/storyboarding/control">
-  <Id Name="System.Storyboarding.Backgrounds.WebBrowser" Revision="1" Stencil="System.Storyboarding.Backgrounds" StencilVersion="0.1"/>
+  <Id Name="System.Storyboarding.Common.Text" Revision="1" Stencil="System.Storyboarding.Common" StencilVersion="0.1"/>
 </Control>
 </file>
 
 <file path=customXml/item31.xml><?xml version="1.0" encoding="utf-8"?>
 <Control xmlns="http://schemas.microsoft.com/VisualStudio/2011/storyboarding/control">
-  <Id Name="System.Storyboarding.Common.Button" Revision="1" Stencil="System.Storyboarding.Common" StencilVersion="0.1"/>
+  <Id Name="System.Storyboarding.Common.Text" Revision="1" Stencil="System.Storyboarding.Common" StencilVersion="0.1"/>
 </Control>
 </file>
 
@@ -11183,31 +11263,31 @@
 
 <file path=customXml/item33.xml><?xml version="1.0" encoding="utf-8"?>
 <Control xmlns="http://schemas.microsoft.com/VisualStudio/2011/storyboarding/control">
-  <Id Name="System.Storyboarding.Backgrounds.WindowsPhoneLandscape" Revision="1" Stencil="System.Storyboarding.Backgrounds" StencilVersion="0.1"/>
+  <Id Name="System.Storyboarding.Icons.User" Revision="1" Stencil="System.Storyboarding.Icons" StencilVersion="0.1"/>
 </Control>
 </file>
 
 <file path=customXml/item34.xml><?xml version="1.0" encoding="utf-8"?>
 <Control xmlns="http://schemas.microsoft.com/VisualStudio/2011/storyboarding/control">
-  <Id Name="System.Storyboarding.Common.Text" Revision="1" Stencil="System.Storyboarding.Common" StencilVersion="0.1"/>
+  <Id Name="System.Storyboarding.Backgrounds.WindowsPhone" Revision="1" Stencil="System.Storyboarding.Backgrounds" StencilVersion="0.1"/>
 </Control>
 </file>
 
 <file path=customXml/item35.xml><?xml version="1.0" encoding="utf-8"?>
 <Control xmlns="http://schemas.microsoft.com/VisualStudio/2011/storyboarding/control">
-  <Id Name="System.Storyboarding.Icons.User" Revision="1" Stencil="System.Storyboarding.Icons" StencilVersion="0.1"/>
+  <Id Name="System.Storyboarding.Backgrounds.WebBrowser" Revision="1" Stencil="System.Storyboarding.Backgrounds" StencilVersion="0.1"/>
 </Control>
 </file>
 
 <file path=customXml/item36.xml><?xml version="1.0" encoding="utf-8"?>
 <Control xmlns="http://schemas.microsoft.com/VisualStudio/2011/storyboarding/control">
-  <Id Name="System.Storyboarding.Common.Text" Revision="1" Stencil="System.Storyboarding.Common" StencilVersion="0.1"/>
+  <Id Name="System.Storyboarding.Common.TextInput" Revision="1" Stencil="System.Storyboarding.Common" StencilVersion="0.1"/>
 </Control>
 </file>
 
 <file path=customXml/item37.xml><?xml version="1.0" encoding="utf-8"?>
 <Control xmlns="http://schemas.microsoft.com/VisualStudio/2011/storyboarding/control">
-  <Id Name="System.Storyboarding.Common.Text" Revision="1" Stencil="System.Storyboarding.Common" StencilVersion="0.1"/>
+  <Id Name="System.Storyboarding.Common.TextInput" Revision="1" Stencil="System.Storyboarding.Common" StencilVersion="0.1"/>
 </Control>
 </file>
 
@@ -11219,7 +11299,7 @@
 
 <file path=customXml/item39.xml><?xml version="1.0" encoding="utf-8"?>
 <Control xmlns="http://schemas.microsoft.com/VisualStudio/2011/storyboarding/control">
-  <Id Name="System.Storyboarding.Common.Text" Revision="1" Stencil="System.Storyboarding.Common" StencilVersion="0.1"/>
+  <Id Name="System.Storyboarding.Backgrounds.WebBrowser" Revision="1" Stencil="System.Storyboarding.Backgrounds" StencilVersion="0.1"/>
 </Control>
 </file>
 
@@ -11231,7 +11311,7 @@
 
 <file path=customXml/item40.xml><?xml version="1.0" encoding="utf-8"?>
 <Control xmlns="http://schemas.microsoft.com/VisualStudio/2011/storyboarding/control">
-  <Id Name="System.Storyboarding.Common.Text" Revision="1" Stencil="System.Storyboarding.Common" StencilVersion="0.1"/>
+  <Id Name="System.Storyboarding.Common.Button" Revision="1" Stencil="System.Storyboarding.Common" StencilVersion="0.1"/>
 </Control>
 </file>
 
@@ -11241,15 +11321,27 @@
 </Control>
 </file>
 
+<file path=customXml/item42.xml><?xml version="1.0" encoding="utf-8"?>
+<Control xmlns="http://schemas.microsoft.com/VisualStudio/2011/storyboarding/control">
+  <Id Name="System.Storyboarding.Common.Text" Revision="1" Stencil="System.Storyboarding.Common" StencilVersion="0.1"/>
+</Control>
+</file>
+
+<file path=customXml/item43.xml><?xml version="1.0" encoding="utf-8"?>
+<Control xmlns="http://schemas.microsoft.com/VisualStudio/2011/storyboarding/control">
+  <Id Name="System.Storyboarding.Common.Text" Revision="1" Stencil="System.Storyboarding.Common" StencilVersion="0.1"/>
+</Control>
+</file>
+
 <file path=customXml/item5.xml><?xml version="1.0" encoding="utf-8"?>
 <Control xmlns="http://schemas.microsoft.com/VisualStudio/2011/storyboarding/control">
-  <Id Name="System.Storyboarding.Common.TextInput" Revision="1" Stencil="System.Storyboarding.Common" StencilVersion="0.1"/>
+  <Id Name="System.Storyboarding.Backgrounds.WindowsPhoneLandscape" Revision="1" Stencil="System.Storyboarding.Backgrounds" StencilVersion="0.1"/>
 </Control>
 </file>
 
 <file path=customXml/item6.xml><?xml version="1.0" encoding="utf-8"?>
 <Control xmlns="http://schemas.microsoft.com/VisualStudio/2011/storyboarding/control">
-  <Id Name="System.Storyboarding.Backgrounds.WebBrowser" Revision="1" Stencil="System.Storyboarding.Backgrounds" StencilVersion="0.1"/>
+  <Id Name="System.Storyboarding.Common.Text" Revision="1" Stencil="System.Storyboarding.Common" StencilVersion="0.1"/>
 </Control>
 </file>
 
@@ -11261,17 +11353,41 @@
 
 <file path=customXml/item8.xml><?xml version="1.0" encoding="utf-8"?>
 <Control xmlns="http://schemas.microsoft.com/VisualStudio/2011/storyboarding/control">
-  <Id Name="System.Storyboarding.Backgrounds.WindowsPhone" Revision="1" Stencil="System.Storyboarding.Backgrounds" StencilVersion="0.1"/>
+  <Id Name="System.Storyboarding.Common.TextInput" Revision="1" Stencil="System.Storyboarding.Common" StencilVersion="0.1"/>
 </Control>
 </file>
 
 <file path=customXml/item9.xml><?xml version="1.0" encoding="utf-8"?>
 <Control xmlns="http://schemas.microsoft.com/VisualStudio/2011/storyboarding/control">
-  <Id Name="System.Storyboarding.Common.Text" Revision="1" Stencil="System.Storyboarding.Common" StencilVersion="0.1"/>
+  <Id Name="System.Storyboarding.Backgrounds.WebBrowser" Revision="1" Stencil="System.Storyboarding.Backgrounds" StencilVersion="0.1"/>
 </Control>
 </file>
 
 <file path=customXml/itemProps1.xml><?xml version="1.0" encoding="utf-8"?>
+<ds:datastoreItem xmlns:ds="http://schemas.openxmlformats.org/officeDocument/2006/customXml" ds:itemID="{5B7DBCCA-82D6-4705-8E56-C44CD2412A33}">
+  <ds:schemaRefs>
+    <ds:schemaRef ds:uri="http://schemas.microsoft.com/VisualStudio/2011/storyboarding/control"/>
+  </ds:schemaRefs>
+</ds:datastoreItem>
+</file>
+
+<file path=customXml/itemProps10.xml><?xml version="1.0" encoding="utf-8"?>
+<ds:datastoreItem xmlns:ds="http://schemas.openxmlformats.org/officeDocument/2006/customXml" ds:itemID="{D9833B6F-3137-4DD4-9271-F02E3222DF3E}">
+  <ds:schemaRefs>
+    <ds:schemaRef ds:uri="http://schemas.microsoft.com/VisualStudio/2011/storyboarding/control"/>
+  </ds:schemaRefs>
+</ds:datastoreItem>
+</file>
+
+<file path=customXml/itemProps11.xml><?xml version="1.0" encoding="utf-8"?>
+<ds:datastoreItem xmlns:ds="http://schemas.openxmlformats.org/officeDocument/2006/customXml" ds:itemID="{FA5AB97C-9636-4D8B-AF93-AF3526549720}">
+  <ds:schemaRefs>
+    <ds:schemaRef ds:uri="http://schemas.microsoft.com/VisualStudio/2011/storyboarding/control"/>
+  </ds:schemaRefs>
+</ds:datastoreItem>
+</file>
+
+<file path=customXml/itemProps12.xml><?xml version="1.0" encoding="utf-8"?>
 <ds:datastoreItem xmlns:ds="http://schemas.openxmlformats.org/officeDocument/2006/customXml" ds:itemID="{BA892619-0C76-46BF-A1E5-E409DF05C4C5}">
   <ds:schemaRefs>
     <ds:schemaRef ds:uri="http://schemas.microsoft.com/VisualStudio/2011/storyboarding/control"/>
@@ -11279,7 +11395,103 @@
 </ds:datastoreItem>
 </file>
 
-<file path=customXml/itemProps10.xml><?xml version="1.0" encoding="utf-8"?>
+<file path=customXml/itemProps13.xml><?xml version="1.0" encoding="utf-8"?>
+<ds:datastoreItem xmlns:ds="http://schemas.openxmlformats.org/officeDocument/2006/customXml" ds:itemID="{4791953E-C724-42FE-B90C-06F5F247AC0B}">
+  <ds:schemaRefs>
+    <ds:schemaRef ds:uri="http://schemas.microsoft.com/VisualStudio/2011/storyboarding/control"/>
+  </ds:schemaRefs>
+</ds:datastoreItem>
+</file>
+
+<file path=customXml/itemProps14.xml><?xml version="1.0" encoding="utf-8"?>
+<ds:datastoreItem xmlns:ds="http://schemas.openxmlformats.org/officeDocument/2006/customXml" ds:itemID="{99CE0A09-15EE-4467-B74F-F200B8785290}">
+  <ds:schemaRefs>
+    <ds:schemaRef ds:uri="http://schemas.microsoft.com/VisualStudio/2011/storyboarding/control"/>
+  </ds:schemaRefs>
+</ds:datastoreItem>
+</file>
+
+<file path=customXml/itemProps15.xml><?xml version="1.0" encoding="utf-8"?>
+<ds:datastoreItem xmlns:ds="http://schemas.openxmlformats.org/officeDocument/2006/customXml" ds:itemID="{33F1231F-0306-4431-B9A3-C4103AB3FAD4}">
+  <ds:schemaRefs>
+    <ds:schemaRef ds:uri="http://schemas.microsoft.com/VisualStudio/2011/storyboarding/control"/>
+  </ds:schemaRefs>
+</ds:datastoreItem>
+</file>
+
+<file path=customXml/itemProps16.xml><?xml version="1.0" encoding="utf-8"?>
+<ds:datastoreItem xmlns:ds="http://schemas.openxmlformats.org/officeDocument/2006/customXml" ds:itemID="{487173A5-A9D2-4BCA-990A-1965DC6A52B3}">
+  <ds:schemaRefs>
+    <ds:schemaRef ds:uri="http://schemas.microsoft.com/VisualStudio/2011/storyboarding/control"/>
+  </ds:schemaRefs>
+</ds:datastoreItem>
+</file>
+
+<file path=customXml/itemProps17.xml><?xml version="1.0" encoding="utf-8"?>
+<ds:datastoreItem xmlns:ds="http://schemas.openxmlformats.org/officeDocument/2006/customXml" ds:itemID="{2B4A03D5-4470-4553-86AB-6401919B7EC4}">
+  <ds:schemaRefs>
+    <ds:schemaRef ds:uri="http://schemas.microsoft.com/VisualStudio/2011/storyboarding/control"/>
+  </ds:schemaRefs>
+</ds:datastoreItem>
+</file>
+
+<file path=customXml/itemProps18.xml><?xml version="1.0" encoding="utf-8"?>
+<ds:datastoreItem xmlns:ds="http://schemas.openxmlformats.org/officeDocument/2006/customXml" ds:itemID="{E1DB7C28-9C55-4A48-9215-0DEFB448D534}">
+  <ds:schemaRefs>
+    <ds:schemaRef ds:uri="http://schemas.microsoft.com/VisualStudio/2011/storyboarding/control"/>
+  </ds:schemaRefs>
+</ds:datastoreItem>
+</file>
+
+<file path=customXml/itemProps19.xml><?xml version="1.0" encoding="utf-8"?>
+<ds:datastoreItem xmlns:ds="http://schemas.openxmlformats.org/officeDocument/2006/customXml" ds:itemID="{7FF320C6-52DF-4CDE-B8DF-7DAD5BDF98B0}">
+  <ds:schemaRefs>
+    <ds:schemaRef ds:uri="http://schemas.microsoft.com/VisualStudio/2011/storyboarding/control"/>
+  </ds:schemaRefs>
+</ds:datastoreItem>
+</file>
+
+<file path=customXml/itemProps2.xml><?xml version="1.0" encoding="utf-8"?>
+<ds:datastoreItem xmlns:ds="http://schemas.openxmlformats.org/officeDocument/2006/customXml" ds:itemID="{83197DEB-3330-47B2-AAEF-913A4A605B50}">
+  <ds:schemaRefs>
+    <ds:schemaRef ds:uri="http://schemas.microsoft.com/VisualStudio/2011/storyboarding/control"/>
+  </ds:schemaRefs>
+</ds:datastoreItem>
+</file>
+
+<file path=customXml/itemProps20.xml><?xml version="1.0" encoding="utf-8"?>
+<ds:datastoreItem xmlns:ds="http://schemas.openxmlformats.org/officeDocument/2006/customXml" ds:itemID="{2AC127BD-FC4D-4BF5-A50B-50CEE625CC83}">
+  <ds:schemaRefs>
+    <ds:schemaRef ds:uri="http://schemas.microsoft.com/VisualStudio/2011/storyboarding/control"/>
+  </ds:schemaRefs>
+</ds:datastoreItem>
+</file>
+
+<file path=customXml/itemProps21.xml><?xml version="1.0" encoding="utf-8"?>
+<ds:datastoreItem xmlns:ds="http://schemas.openxmlformats.org/officeDocument/2006/customXml" ds:itemID="{E728FC32-ED93-427B-B9DE-6916B1306E12}">
+  <ds:schemaRefs>
+    <ds:schemaRef ds:uri="http://schemas.microsoft.com/VisualStudio/2011/storyboarding/control"/>
+  </ds:schemaRefs>
+</ds:datastoreItem>
+</file>
+
+<file path=customXml/itemProps22.xml><?xml version="1.0" encoding="utf-8"?>
+<ds:datastoreItem xmlns:ds="http://schemas.openxmlformats.org/officeDocument/2006/customXml" ds:itemID="{136156A8-E1CA-4F3D-82AA-BE652C9F64F2}">
+  <ds:schemaRefs>
+    <ds:schemaRef ds:uri="http://schemas.microsoft.com/VisualStudio/2011/storyboarding/control"/>
+  </ds:schemaRefs>
+</ds:datastoreItem>
+</file>
+
+<file path=customXml/itemProps23.xml><?xml version="1.0" encoding="utf-8"?>
+<ds:datastoreItem xmlns:ds="http://schemas.openxmlformats.org/officeDocument/2006/customXml" ds:itemID="{AB54C1FC-FEDD-4C34-956D-D26CC62F50F0}">
+  <ds:schemaRefs>
+    <ds:schemaRef ds:uri="http://schemas.microsoft.com/VisualStudio/2011/storyboarding/control"/>
+  </ds:schemaRefs>
+</ds:datastoreItem>
+</file>
+
+<file path=customXml/itemProps24.xml><?xml version="1.0" encoding="utf-8"?>
 <ds:datastoreItem xmlns:ds="http://schemas.openxmlformats.org/officeDocument/2006/customXml" ds:itemID="{21B35B14-483B-4E76-AAEC-4BB3303C976B}">
   <ds:schemaRefs>
     <ds:schemaRef ds:uri="http://schemas.microsoft.com/VisualStudio/2011/storyboarding/control"/>
@@ -11287,23 +11499,95 @@
 </ds:datastoreItem>
 </file>
 
-<file path=customXml/itemProps11.xml><?xml version="1.0" encoding="utf-8"?>
-<ds:datastoreItem xmlns:ds="http://schemas.openxmlformats.org/officeDocument/2006/customXml" ds:itemID="{99CE0A09-15EE-4467-B74F-F200B8785290}">
+<file path=customXml/itemProps25.xml><?xml version="1.0" encoding="utf-8"?>
+<ds:datastoreItem xmlns:ds="http://schemas.openxmlformats.org/officeDocument/2006/customXml" ds:itemID="{C2504A3A-27C7-4086-A1D3-270B0D361FAE}">
   <ds:schemaRefs>
     <ds:schemaRef ds:uri="http://schemas.microsoft.com/VisualStudio/2011/storyboarding/control"/>
   </ds:schemaRefs>
 </ds:datastoreItem>
 </file>
 
-<file path=customXml/itemProps12.xml><?xml version="1.0" encoding="utf-8"?>
-<ds:datastoreItem xmlns:ds="http://schemas.openxmlformats.org/officeDocument/2006/customXml" ds:itemID="{83197DEB-3330-47B2-AAEF-913A4A605B50}">
+<file path=customXml/itemProps26.xml><?xml version="1.0" encoding="utf-8"?>
+<ds:datastoreItem xmlns:ds="http://schemas.openxmlformats.org/officeDocument/2006/customXml" ds:itemID="{C8E74E62-AB25-4C59-BE0D-F220CD8CFE7E}">
   <ds:schemaRefs>
     <ds:schemaRef ds:uri="http://schemas.microsoft.com/VisualStudio/2011/storyboarding/control"/>
   </ds:schemaRefs>
 </ds:datastoreItem>
 </file>
 
-<file path=customXml/itemProps13.xml><?xml version="1.0" encoding="utf-8"?>
+<file path=customXml/itemProps27.xml><?xml version="1.0" encoding="utf-8"?>
+<ds:datastoreItem xmlns:ds="http://schemas.openxmlformats.org/officeDocument/2006/customXml" ds:itemID="{7438C02F-1FDC-41DC-A6F8-93C6F64BE611}">
+  <ds:schemaRefs>
+    <ds:schemaRef ds:uri="http://schemas.microsoft.com/VisualStudio/2011/storyboarding/control"/>
+  </ds:schemaRefs>
+</ds:datastoreItem>
+</file>
+
+<file path=customXml/itemProps28.xml><?xml version="1.0" encoding="utf-8"?>
+<ds:datastoreItem xmlns:ds="http://schemas.openxmlformats.org/officeDocument/2006/customXml" ds:itemID="{136014BA-D270-416C-8946-B41E38CA0C08}">
+  <ds:schemaRefs>
+    <ds:schemaRef ds:uri="http://schemas.microsoft.com/VisualStudio/2011/storyboarding/control"/>
+  </ds:schemaRefs>
+</ds:datastoreItem>
+</file>
+
+<file path=customXml/itemProps29.xml><?xml version="1.0" encoding="utf-8"?>
+<ds:datastoreItem xmlns:ds="http://schemas.openxmlformats.org/officeDocument/2006/customXml" ds:itemID="{CB32F49F-076A-40EB-9F8E-BE7E4BAE59FC}">
+  <ds:schemaRefs>
+    <ds:schemaRef ds:uri="http://schemas.microsoft.com/VisualStudio/2011/storyboarding/control"/>
+  </ds:schemaRefs>
+</ds:datastoreItem>
+</file>
+
+<file path=customXml/itemProps3.xml><?xml version="1.0" encoding="utf-8"?>
+<ds:datastoreItem xmlns:ds="http://schemas.openxmlformats.org/officeDocument/2006/customXml" ds:itemID="{A2684E2E-53E5-4026-B555-4EC24CA631FD}">
+  <ds:schemaRefs>
+    <ds:schemaRef ds:uri="http://schemas.microsoft.com/VisualStudio/2011/storyboarding/control"/>
+  </ds:schemaRefs>
+</ds:datastoreItem>
+</file>
+
+<file path=customXml/itemProps30.xml><?xml version="1.0" encoding="utf-8"?>
+<ds:datastoreItem xmlns:ds="http://schemas.openxmlformats.org/officeDocument/2006/customXml" ds:itemID="{8517BDEE-C78A-467C-908C-749FEE10693B}">
+  <ds:schemaRefs>
+    <ds:schemaRef ds:uri="http://schemas.microsoft.com/VisualStudio/2011/storyboarding/control"/>
+  </ds:schemaRefs>
+</ds:datastoreItem>
+</file>
+
+<file path=customXml/itemProps31.xml><?xml version="1.0" encoding="utf-8"?>
+<ds:datastoreItem xmlns:ds="http://schemas.openxmlformats.org/officeDocument/2006/customXml" ds:itemID="{A6B2C5C4-9808-4527-AA60-BBEECDB27678}">
+  <ds:schemaRefs>
+    <ds:schemaRef ds:uri="http://schemas.microsoft.com/VisualStudio/2011/storyboarding/control"/>
+  </ds:schemaRefs>
+</ds:datastoreItem>
+</file>
+
+<file path=customXml/itemProps32.xml><?xml version="1.0" encoding="utf-8"?>
+<ds:datastoreItem xmlns:ds="http://schemas.openxmlformats.org/officeDocument/2006/customXml" ds:itemID="{6054DAC1-D987-43B9-93D9-57F739300240}">
+  <ds:schemaRefs>
+    <ds:schemaRef ds:uri="http://schemas.microsoft.com/VisualStudio/2011/storyboarding/control"/>
+  </ds:schemaRefs>
+</ds:datastoreItem>
+</file>
+
+<file path=customXml/itemProps33.xml><?xml version="1.0" encoding="utf-8"?>
+<ds:datastoreItem xmlns:ds="http://schemas.openxmlformats.org/officeDocument/2006/customXml" ds:itemID="{423687A7-6E3F-4DD5-9CC3-FE2A2B207FBD}">
+  <ds:schemaRefs>
+    <ds:schemaRef ds:uri="http://schemas.microsoft.com/VisualStudio/2011/storyboarding/control"/>
+  </ds:schemaRefs>
+</ds:datastoreItem>
+</file>
+
+<file path=customXml/itemProps34.xml><?xml version="1.0" encoding="utf-8"?>
+<ds:datastoreItem xmlns:ds="http://schemas.openxmlformats.org/officeDocument/2006/customXml" ds:itemID="{630F5366-1F32-4414-AB41-55974A04D14B}">
+  <ds:schemaRefs>
+    <ds:schemaRef ds:uri="http://schemas.microsoft.com/VisualStudio/2011/storyboarding/control"/>
+  </ds:schemaRefs>
+</ds:datastoreItem>
+</file>
+
+<file path=customXml/itemProps35.xml><?xml version="1.0" encoding="utf-8"?>
 <ds:datastoreItem xmlns:ds="http://schemas.openxmlformats.org/officeDocument/2006/customXml" ds:itemID="{D00F8AC5-EF27-4A9B-A91C-AE690D7BB764}">
   <ds:schemaRefs>
     <ds:schemaRef ds:uri="http://schemas.microsoft.com/VisualStudio/2011/storyboarding/control"/>
@@ -11311,23 +11595,103 @@
 </ds:datastoreItem>
 </file>
 
-<file path=customXml/itemProps14.xml><?xml version="1.0" encoding="utf-8"?>
-<ds:datastoreItem xmlns:ds="http://schemas.openxmlformats.org/officeDocument/2006/customXml" ds:itemID="{CB32F49F-076A-40EB-9F8E-BE7E4BAE59FC}">
+<file path=customXml/itemProps36.xml><?xml version="1.0" encoding="utf-8"?>
+<ds:datastoreItem xmlns:ds="http://schemas.openxmlformats.org/officeDocument/2006/customXml" ds:itemID="{51813988-371F-4558-AD72-031874772D90}">
   <ds:schemaRefs>
     <ds:schemaRef ds:uri="http://schemas.microsoft.com/VisualStudio/2011/storyboarding/control"/>
   </ds:schemaRefs>
 </ds:datastoreItem>
 </file>
 
-<file path=customXml/itemProps15.xml><?xml version="1.0" encoding="utf-8"?>
-<ds:datastoreItem xmlns:ds="http://schemas.openxmlformats.org/officeDocument/2006/customXml" ds:itemID="{2AC127BD-FC4D-4BF5-A50B-50CEE625CC83}">
+<file path=customXml/itemProps37.xml><?xml version="1.0" encoding="utf-8"?>
+<ds:datastoreItem xmlns:ds="http://schemas.openxmlformats.org/officeDocument/2006/customXml" ds:itemID="{C497CC49-5F10-4726-8D1E-12787F46C45D}">
   <ds:schemaRefs>
     <ds:schemaRef ds:uri="http://schemas.microsoft.com/VisualStudio/2011/storyboarding/control"/>
   </ds:schemaRefs>
 </ds:datastoreItem>
 </file>
 
-<file path=customXml/itemProps16.xml><?xml version="1.0" encoding="utf-8"?>
+<file path=customXml/itemProps38.xml><?xml version="1.0" encoding="utf-8"?>
+<ds:datastoreItem xmlns:ds="http://schemas.openxmlformats.org/officeDocument/2006/customXml" ds:itemID="{3F764F7C-36D1-4912-8EE3-C8B3BF60AC67}">
+  <ds:schemaRefs>
+    <ds:schemaRef ds:uri="http://schemas.microsoft.com/VisualStudio/2011/storyboarding/control"/>
+  </ds:schemaRefs>
+</ds:datastoreItem>
+</file>
+
+<file path=customXml/itemProps39.xml><?xml version="1.0" encoding="utf-8"?>
+<ds:datastoreItem xmlns:ds="http://schemas.openxmlformats.org/officeDocument/2006/customXml" ds:itemID="{3268A3EF-D6CA-49B5-A04C-91B4AA53FFB2}">
+  <ds:schemaRefs>
+    <ds:schemaRef ds:uri="http://schemas.microsoft.com/VisualStudio/2011/storyboarding/control"/>
+  </ds:schemaRefs>
+</ds:datastoreItem>
+</file>
+
+<file path=customXml/itemProps4.xml><?xml version="1.0" encoding="utf-8"?>
+<ds:datastoreItem xmlns:ds="http://schemas.openxmlformats.org/officeDocument/2006/customXml" ds:itemID="{6B70A699-757D-44F4-9864-4A570AC44872}">
+  <ds:schemaRefs>
+    <ds:schemaRef ds:uri="http://schemas.microsoft.com/VisualStudio/2011/storyboarding/control"/>
+  </ds:schemaRefs>
+</ds:datastoreItem>
+</file>
+
+<file path=customXml/itemProps40.xml><?xml version="1.0" encoding="utf-8"?>
+<ds:datastoreItem xmlns:ds="http://schemas.openxmlformats.org/officeDocument/2006/customXml" ds:itemID="{178F558B-944C-4D3E-8BC7-37CF64AF3827}">
+  <ds:schemaRefs>
+    <ds:schemaRef ds:uri="http://schemas.microsoft.com/VisualStudio/2011/storyboarding/control"/>
+  </ds:schemaRefs>
+</ds:datastoreItem>
+</file>
+
+<file path=customXml/itemProps41.xml><?xml version="1.0" encoding="utf-8"?>
+<ds:datastoreItem xmlns:ds="http://schemas.openxmlformats.org/officeDocument/2006/customXml" ds:itemID="{CAEA2DC9-8CBF-493B-A219-676DC86EE2A9}">
+  <ds:schemaRefs>
+    <ds:schemaRef ds:uri="http://schemas.microsoft.com/VisualStudio/2011/storyboarding/control"/>
+  </ds:schemaRefs>
+</ds:datastoreItem>
+</file>
+
+<file path=customXml/itemProps42.xml><?xml version="1.0" encoding="utf-8"?>
+<ds:datastoreItem xmlns:ds="http://schemas.openxmlformats.org/officeDocument/2006/customXml" ds:itemID="{147C504D-FB10-405C-824D-2DD72E61F302}">
+  <ds:schemaRefs>
+    <ds:schemaRef ds:uri="http://schemas.microsoft.com/VisualStudio/2011/storyboarding/control"/>
+  </ds:schemaRefs>
+</ds:datastoreItem>
+</file>
+
+<file path=customXml/itemProps43.xml><?xml version="1.0" encoding="utf-8"?>
+<ds:datastoreItem xmlns:ds="http://schemas.openxmlformats.org/officeDocument/2006/customXml" ds:itemID="{65137127-AA4C-4449-B5C5-98023B7CCE73}">
+  <ds:schemaRefs>
+    <ds:schemaRef ds:uri="http://schemas.microsoft.com/VisualStudio/2011/storyboarding/control"/>
+  </ds:schemaRefs>
+</ds:datastoreItem>
+</file>
+
+<file path=customXml/itemProps5.xml><?xml version="1.0" encoding="utf-8"?>
+<ds:datastoreItem xmlns:ds="http://schemas.openxmlformats.org/officeDocument/2006/customXml" ds:itemID="{92AEB5D9-C09C-4C16-AC2C-EAF95389FAED}">
+  <ds:schemaRefs>
+    <ds:schemaRef ds:uri="http://schemas.microsoft.com/VisualStudio/2011/storyboarding/control"/>
+  </ds:schemaRefs>
+</ds:datastoreItem>
+</file>
+
+<file path=customXml/itemProps6.xml><?xml version="1.0" encoding="utf-8"?>
+<ds:datastoreItem xmlns:ds="http://schemas.openxmlformats.org/officeDocument/2006/customXml" ds:itemID="{ECD89AED-453D-4F9D-8FAF-94400C51181B}">
+  <ds:schemaRefs>
+    <ds:schemaRef ds:uri="http://schemas.microsoft.com/VisualStudio/2011/storyboarding/control"/>
+  </ds:schemaRefs>
+</ds:datastoreItem>
+</file>
+
+<file path=customXml/itemProps7.xml><?xml version="1.0" encoding="utf-8"?>
+<ds:datastoreItem xmlns:ds="http://schemas.openxmlformats.org/officeDocument/2006/customXml" ds:itemID="{67CF3844-0CC4-4FA0-ACDF-BF763B8E0F78}">
+  <ds:schemaRefs>
+    <ds:schemaRef ds:uri="http://schemas.microsoft.com/VisualStudio/2011/storyboarding/control"/>
+  </ds:schemaRefs>
+</ds:datastoreItem>
+</file>
+
+<file path=customXml/itemProps8.xml><?xml version="1.0" encoding="utf-8"?>
 <ds:datastoreItem xmlns:ds="http://schemas.openxmlformats.org/officeDocument/2006/customXml" ds:itemID="{986B96FE-18A9-49B5-A777-8363FE00896C}">
   <ds:schemaRefs>
     <ds:schemaRef ds:uri="http://schemas.microsoft.com/VisualStudio/2011/storyboarding/control"/>
@@ -11335,266 +11699,10 @@
 </ds:datastoreItem>
 </file>
 
-<file path=customXml/itemProps17.xml><?xml version="1.0" encoding="utf-8"?>
-<ds:datastoreItem xmlns:ds="http://schemas.openxmlformats.org/officeDocument/2006/customXml" ds:itemID="{A2684E2E-53E5-4026-B555-4EC24CA631FD}">
-  <ds:schemaRefs>
-    <ds:schemaRef ds:uri="http://schemas.microsoft.com/VisualStudio/2011/storyboarding/control"/>
-  </ds:schemaRefs>
-</ds:datastoreItem>
-</file>
-
-<file path=customXml/itemProps18.xml><?xml version="1.0" encoding="utf-8"?>
-<ds:datastoreItem xmlns:ds="http://schemas.openxmlformats.org/officeDocument/2006/customXml" ds:itemID="{51813988-371F-4558-AD72-031874772D90}">
-  <ds:schemaRefs>
-    <ds:schemaRef ds:uri="http://schemas.microsoft.com/VisualStudio/2011/storyboarding/control"/>
-  </ds:schemaRefs>
-</ds:datastoreItem>
-</file>
-
-<file path=customXml/itemProps19.xml><?xml version="1.0" encoding="utf-8"?>
-<ds:datastoreItem xmlns:ds="http://schemas.openxmlformats.org/officeDocument/2006/customXml" ds:itemID="{C2504A3A-27C7-4086-A1D3-270B0D361FAE}">
-  <ds:schemaRefs>
-    <ds:schemaRef ds:uri="http://schemas.microsoft.com/VisualStudio/2011/storyboarding/control"/>
-  </ds:schemaRefs>
-</ds:datastoreItem>
-</file>
-
-<file path=customXml/itemProps2.xml><?xml version="1.0" encoding="utf-8"?>
-<ds:datastoreItem xmlns:ds="http://schemas.openxmlformats.org/officeDocument/2006/customXml" ds:itemID="{67CF3844-0CC4-4FA0-ACDF-BF763B8E0F78}">
-  <ds:schemaRefs>
-    <ds:schemaRef ds:uri="http://schemas.microsoft.com/VisualStudio/2011/storyboarding/control"/>
-  </ds:schemaRefs>
-</ds:datastoreItem>
-</file>
-
-<file path=customXml/itemProps20.xml><?xml version="1.0" encoding="utf-8"?>
+<file path=customXml/itemProps9.xml><?xml version="1.0" encoding="utf-8"?>
 <ds:datastoreItem xmlns:ds="http://schemas.openxmlformats.org/officeDocument/2006/customXml" ds:itemID="{D5275AD7-2249-4A8F-B1FE-589D43E34F89}">
   <ds:schemaRefs>
     <ds:schemaRef ds:uri="http://schemas.microsoft.com/VisualStudio/2011/storyboarding/control"/>
   </ds:schemaRefs>
 </ds:datastoreItem>
-</file>
-
-<file path=customXml/itemProps21.xml><?xml version="1.0" encoding="utf-8"?>
-<ds:datastoreItem xmlns:ds="http://schemas.openxmlformats.org/officeDocument/2006/customXml" ds:itemID="{178F558B-944C-4D3E-8BC7-37CF64AF3827}">
-  <ds:schemaRefs>
-    <ds:schemaRef ds:uri="http://schemas.microsoft.com/VisualStudio/2011/storyboarding/control"/>
-  </ds:schemaRefs>
-</ds:datastoreItem>
-</file>
-
-<file path=customXml/itemProps22.xml><?xml version="1.0" encoding="utf-8"?>
-<ds:datastoreItem xmlns:ds="http://schemas.openxmlformats.org/officeDocument/2006/customXml" ds:itemID="{8517BDEE-C78A-467C-908C-749FEE10693B}">
-  <ds:schemaRefs>
-    <ds:schemaRef ds:uri="http://schemas.microsoft.com/VisualStudio/2011/storyboarding/control"/>
-  </ds:schemaRefs>
-</ds:datastoreItem>
-</file>
-
-<file path=customXml/itemProps23.xml><?xml version="1.0" encoding="utf-8"?>
-<ds:datastoreItem xmlns:ds="http://schemas.openxmlformats.org/officeDocument/2006/customXml" ds:itemID="{E728FC32-ED93-427B-B9DE-6916B1306E12}">
-  <ds:schemaRefs>
-    <ds:schemaRef ds:uri="http://schemas.microsoft.com/VisualStudio/2011/storyboarding/control"/>
-  </ds:schemaRefs>
-</ds:datastoreItem>
-</file>
-
-<file path=customXml/itemProps24.xml><?xml version="1.0" encoding="utf-8"?>
-<ds:datastoreItem xmlns:ds="http://schemas.openxmlformats.org/officeDocument/2006/customXml" ds:itemID="{33F1231F-0306-4431-B9A3-C4103AB3FAD4}">
-  <ds:schemaRefs>
-    <ds:schemaRef ds:uri="http://schemas.microsoft.com/VisualStudio/2011/storyboarding/control"/>
-  </ds:schemaRefs>
-</ds:datastoreItem>
-</file>
-
-<file path=customXml/itemProps25.xml><?xml version="1.0" encoding="utf-8"?>
-<ds:datastoreItem xmlns:ds="http://schemas.openxmlformats.org/officeDocument/2006/customXml" ds:itemID="{6B70A699-757D-44F4-9864-4A570AC44872}">
-  <ds:schemaRefs>
-    <ds:schemaRef ds:uri="http://schemas.microsoft.com/VisualStudio/2011/storyboarding/control"/>
-  </ds:schemaRefs>
-</ds:datastoreItem>
-</file>
-
-<file path=customXml/itemProps26.xml><?xml version="1.0" encoding="utf-8"?>
-<ds:datastoreItem xmlns:ds="http://schemas.openxmlformats.org/officeDocument/2006/customXml" ds:itemID="{C497CC49-5F10-4726-8D1E-12787F46C45D}">
-  <ds:schemaRefs>
-    <ds:schemaRef ds:uri="http://schemas.microsoft.com/VisualStudio/2011/storyboarding/control"/>
-  </ds:schemaRefs>
-</ds:datastoreItem>
-</file>
-
-<file path=customXml/itemProps27.xml><?xml version="1.0" encoding="utf-8"?>
-<ds:datastoreItem xmlns:ds="http://schemas.openxmlformats.org/officeDocument/2006/customXml" ds:itemID="{A6B2C5C4-9808-4527-AA60-BBEECDB27678}">
-  <ds:schemaRefs>
-    <ds:schemaRef ds:uri="http://schemas.microsoft.com/VisualStudio/2011/storyboarding/control"/>
-  </ds:schemaRefs>
-</ds:datastoreItem>
-</file>
-
-<file path=customXml/itemProps28.xml><?xml version="1.0" encoding="utf-8"?>
-<ds:datastoreItem xmlns:ds="http://schemas.openxmlformats.org/officeDocument/2006/customXml" ds:itemID="{136156A8-E1CA-4F3D-82AA-BE652C9F64F2}">
-  <ds:schemaRefs>
-    <ds:schemaRef ds:uri="http://schemas.microsoft.com/VisualStudio/2011/storyboarding/control"/>
-  </ds:schemaRefs>
-</ds:datastoreItem>
-</file>
-
-<file path=customXml/itemProps29.xml><?xml version="1.0" encoding="utf-8"?>
-<ds:datastoreItem xmlns:ds="http://schemas.openxmlformats.org/officeDocument/2006/customXml" ds:itemID="{D9833B6F-3137-4DD4-9271-F02E3222DF3E}">
-  <ds:schemaRefs>
-    <ds:schemaRef ds:uri="http://schemas.microsoft.com/VisualStudio/2011/storyboarding/control"/>
-  </ds:schemaRefs>
-</ds:datastoreItem>
-</file>
-
-<file path=customXml/itemProps3.xml><?xml version="1.0" encoding="utf-8"?>
-<ds:datastoreItem xmlns:ds="http://schemas.openxmlformats.org/officeDocument/2006/customXml" ds:itemID="{3268A3EF-D6CA-49B5-A04C-91B4AA53FFB2}">
-  <ds:schemaRefs>
-    <ds:schemaRef ds:uri="http://schemas.microsoft.com/VisualStudio/2011/storyboarding/control"/>
-  </ds:schemaRefs>
-</ds:datastoreItem>
-</file>
-
-<file path=customXml/itemProps30.xml><?xml version="1.0" encoding="utf-8"?>
-<ds:datastoreItem xmlns:ds="http://schemas.openxmlformats.org/officeDocument/2006/customXml" ds:itemID="{6054DAC1-D987-43B9-93D9-57F739300240}">
-  <ds:schemaRefs>
-    <ds:schemaRef ds:uri="http://schemas.microsoft.com/VisualStudio/2011/storyboarding/control"/>
-  </ds:schemaRefs>
-</ds:datastoreItem>
-</file>
-
-<file path=customXml/itemProps31.xml><?xml version="1.0" encoding="utf-8"?>
-<ds:datastoreItem xmlns:ds="http://schemas.openxmlformats.org/officeDocument/2006/customXml" ds:itemID="{C8E74E62-AB25-4C59-BE0D-F220CD8CFE7E}">
-  <ds:schemaRefs>
-    <ds:schemaRef ds:uri="http://schemas.microsoft.com/VisualStudio/2011/storyboarding/control"/>
-  </ds:schemaRefs>
-</ds:datastoreItem>
-</file>
-
-<file path=customXml/itemProps32.xml><?xml version="1.0" encoding="utf-8"?>
-<ds:datastoreItem xmlns:ds="http://schemas.openxmlformats.org/officeDocument/2006/customXml" ds:itemID="{487173A5-A9D2-4BCA-990A-1965DC6A52B3}">
-  <ds:schemaRefs>
-    <ds:schemaRef ds:uri="http://schemas.microsoft.com/VisualStudio/2011/storyboarding/control"/>
-  </ds:schemaRefs>
-</ds:datastoreItem>
-</file>
-
-<file path=customXml/itemProps33.xml><?xml version="1.0" encoding="utf-8"?>
-<ds:datastoreItem xmlns:ds="http://schemas.openxmlformats.org/officeDocument/2006/customXml" ds:itemID="{92AEB5D9-C09C-4C16-AC2C-EAF95389FAED}">
-  <ds:schemaRefs>
-    <ds:schemaRef ds:uri="http://schemas.microsoft.com/VisualStudio/2011/storyboarding/control"/>
-  </ds:schemaRefs>
-</ds:datastoreItem>
-</file>
-
-<file path=customXml/itemProps34.xml><?xml version="1.0" encoding="utf-8"?>
-<ds:datastoreItem xmlns:ds="http://schemas.openxmlformats.org/officeDocument/2006/customXml" ds:itemID="{CAEA2DC9-8CBF-493B-A219-676DC86EE2A9}">
-  <ds:schemaRefs>
-    <ds:schemaRef ds:uri="http://schemas.microsoft.com/VisualStudio/2011/storyboarding/control"/>
-  </ds:schemaRefs>
-</ds:datastoreItem>
-</file>
-
-<file path=customXml/itemProps35.xml><?xml version="1.0" encoding="utf-8"?>
-<ds:datastoreItem xmlns:ds="http://schemas.openxmlformats.org/officeDocument/2006/customXml" ds:itemID="{423687A7-6E3F-4DD5-9CC3-FE2A2B207FBD}">
-  <ds:schemaRefs>
-    <ds:schemaRef ds:uri="http://schemas.microsoft.com/VisualStudio/2011/storyboarding/control"/>
-  </ds:schemaRefs>
-</ds:datastoreItem>
-</file>
-
-<file path=customXml/itemProps36.xml><?xml version="1.0" encoding="utf-8"?>
-<ds:datastoreItem xmlns:ds="http://schemas.openxmlformats.org/officeDocument/2006/customXml" ds:itemID="{AB54C1FC-FEDD-4C34-956D-D26CC62F50F0}">
-  <ds:schemaRefs>
-    <ds:schemaRef ds:uri="http://schemas.microsoft.com/VisualStudio/2011/storyboarding/control"/>
-  </ds:schemaRefs>
-</ds:datastoreItem>
-</file>
-
-<file path=customXml/itemProps37.xml><?xml version="1.0" encoding="utf-8"?>
-<ds:datastoreItem xmlns:ds="http://schemas.openxmlformats.org/officeDocument/2006/customXml" ds:itemID="{2B4A03D5-4470-4553-86AB-6401919B7EC4}">
-  <ds:schemaRefs>
-    <ds:schemaRef ds:uri="http://schemas.microsoft.com/VisualStudio/2011/storyboarding/control"/>
-  </ds:schemaRefs>
-</ds:datastoreItem>
-</file>
-
-<file path=customXml/itemProps38.xml><?xml version="1.0" encoding="utf-8"?>
-<ds:datastoreItem xmlns:ds="http://schemas.openxmlformats.org/officeDocument/2006/customXml" ds:itemID="{ECD89AED-453D-4F9D-8FAF-94400C51181B}">
-  <ds:schemaRefs>
-    <ds:schemaRef ds:uri="http://schemas.microsoft.com/VisualStudio/2011/storyboarding/control"/>
-  </ds:schemaRefs>
-</ds:datastoreItem>
-</file>
-
-<file path=customXml/itemProps39.xml><?xml version="1.0" encoding="utf-8"?>
-<ds:datastoreItem xmlns:ds="http://schemas.openxmlformats.org/officeDocument/2006/customXml" ds:itemID="{3F764F7C-36D1-4912-8EE3-C8B3BF60AC67}">
-  <ds:schemaRefs>
-    <ds:schemaRef ds:uri="http://schemas.microsoft.com/VisualStudio/2011/storyboarding/control"/>
-  </ds:schemaRefs>
-</ds:datastoreItem>
-</file>
-
-<file path=customXml/itemProps4.xml><?xml version="1.0" encoding="utf-8"?>
-<ds:datastoreItem xmlns:ds="http://schemas.openxmlformats.org/officeDocument/2006/customXml" ds:itemID="{7438C02F-1FDC-41DC-A6F8-93C6F64BE611}">
-  <ds:schemaRefs>
-    <ds:schemaRef ds:uri="http://schemas.microsoft.com/VisualStudio/2011/storyboarding/control"/>
-  </ds:schemaRefs>
-</ds:datastoreItem>
-</file>
-
-<file path=customXml/itemProps40.xml><?xml version="1.0" encoding="utf-8"?>
-<ds:datastoreItem xmlns:ds="http://schemas.openxmlformats.org/officeDocument/2006/customXml" ds:itemID="{E1DB7C28-9C55-4A48-9215-0DEFB448D534}">
-  <ds:schemaRefs>
-    <ds:schemaRef ds:uri="http://schemas.microsoft.com/VisualStudio/2011/storyboarding/control"/>
-  </ds:schemaRefs>
-</ds:datastoreItem>
-</file>
-
-<file path=customXml/itemProps41.xml><?xml version="1.0" encoding="utf-8"?>
-<ds:datastoreItem xmlns:ds="http://schemas.openxmlformats.org/officeDocument/2006/customXml" ds:itemID="{FA5AB97C-9636-4D8B-AF93-AF3526549720}">
-  <ds:schemaRefs>
-    <ds:schemaRef ds:uri="http://schemas.microsoft.com/VisualStudio/2011/storyboarding/control"/>
-  </ds:schemaRefs>
-</ds:datastoreItem>
-</file>
-
-<file path=customXml/itemProps5.xml><?xml version="1.0" encoding="utf-8"?>
-<ds:datastoreItem xmlns:ds="http://schemas.openxmlformats.org/officeDocument/2006/customXml" ds:itemID="{7FF320C6-52DF-4CDE-B8DF-7DAD5BDF98B0}">
-  <ds:schemaRefs>
-    <ds:schemaRef ds:uri="http://schemas.microsoft.com/VisualStudio/2011/storyboarding/control"/>
-  </ds:schemaRefs>
-</ds:datastoreItem>
-</file>
-
-<file path=customXml/itemProps6.xml><?xml version="1.0" encoding="utf-8"?>
-<ds:datastoreItem xmlns:ds="http://schemas.openxmlformats.org/officeDocument/2006/customXml" ds:itemID="{4791953E-C724-42FE-B90C-06F5F247AC0B}">
-  <ds:schemaRefs>
-    <ds:schemaRef ds:uri="http://schemas.microsoft.com/VisualStudio/2011/storyboarding/control"/>
-  </ds:schemaRefs>
-</ds:datastoreItem>
-</file>
-
-<file path=customXml/itemProps7.xml><?xml version="1.0" encoding="utf-8"?>
-<ds:datastoreItem xmlns:ds="http://schemas.openxmlformats.org/officeDocument/2006/customXml" ds:itemID="{5B7DBCCA-82D6-4705-8E56-C44CD2412A33}">
-  <ds:schemaRefs>
-    <ds:schemaRef ds:uri="http://schemas.microsoft.com/VisualStudio/2011/storyboarding/control"/>
-  </ds:schemaRefs>
-</ds:datastoreItem>
-</file>
-
-<file path=customXml/itemProps8.xml><?xml version="1.0" encoding="utf-8"?>
-<ds:datastoreItem xmlns:ds="http://schemas.openxmlformats.org/officeDocument/2006/customXml" ds:itemID="{630F5366-1F32-4414-AB41-55974A04D14B}">
-  <ds:schemaRefs>
-    <ds:schemaRef ds:uri="http://schemas.microsoft.com/VisualStudio/2011/storyboarding/control"/>
-  </ds:schemaRefs>
-</ds:datastoreItem>
-</file>
-
-<file path=customXml/itemProps9.xml><?xml version="1.0" encoding="utf-8"?>
-<ds:datastoreItem xmlns:ds="http://schemas.openxmlformats.org/officeDocument/2006/customXml" ds:itemID="{136014BA-D270-416C-8946-B41E38CA0C08}">
-  <ds:schemaRefs>
-    <ds:schemaRef ds:uri="http://schemas.microsoft.com/VisualStudio/2011/storyboarding/control"/>
-  </ds:schemaRefs>
-</ds:datastoreItem>
 </file>
</xml_diff>